<commit_message>
Updated version of the presentation.
</commit_message>
<xml_diff>
--- a/Documents/Presentations/Presentation Evolutionary Algorithms.pptx
+++ b/Documents/Presentations/Presentation Evolutionary Algorithms.pptx
@@ -262,7 +262,7 @@
               <a:pPr>
                 <a:defRPr/>
               </a:pPr>
-              <a:t>9/27/12</a:t>
+              <a:t>10/1/12</a:t>
             </a:fld>
             <a:endParaRPr lang="nl-NL"/>
           </a:p>
@@ -356,7 +356,7 @@
     </p:spTree>
     <p:extLst>
       <p:ext uri="{BB962C8B-B14F-4D97-AF65-F5344CB8AC3E}">
-        <p14:creationId xmlns:mc="http://schemas.openxmlformats.org/markup-compatibility/2006" xmlns:mv="urn:schemas-microsoft-com:mac:vml" xmlns:p14="http://schemas.microsoft.com/office/powerpoint/2010/main" xmlns:p="http://schemas.openxmlformats.org/presentationml/2006/main" xmlns:r="http://schemas.openxmlformats.org/officeDocument/2006/relationships" xmlns:a="http://schemas.openxmlformats.org/drawingml/2006/main" xmlns="" val="2414635666"/>
+        <p14:creationId xmlns="" xmlns:a="http://schemas.openxmlformats.org/drawingml/2006/main" xmlns:r="http://schemas.openxmlformats.org/officeDocument/2006/relationships" xmlns:p="http://schemas.openxmlformats.org/presentationml/2006/main" xmlns:p14="http://schemas.microsoft.com/office/powerpoint/2010/main" xmlns:mv="urn:schemas-microsoft-com:mac:vml" xmlns:mc="http://schemas.openxmlformats.org/markup-compatibility/2006" val="2414635666"/>
       </p:ext>
     </p:extLst>
   </p:cSld>
@@ -466,7 +466,7 @@
               <a:pPr>
                 <a:defRPr/>
               </a:pPr>
-              <a:t>9/27/12</a:t>
+              <a:t>10/1/12</a:t>
             </a:fld>
             <a:endParaRPr lang="nl-NL"/>
           </a:p>
@@ -655,7 +655,7 @@
     </p:spTree>
     <p:extLst>
       <p:ext uri="{BB962C8B-B14F-4D97-AF65-F5344CB8AC3E}">
-        <p14:creationId xmlns:mc="http://schemas.openxmlformats.org/markup-compatibility/2006" xmlns:mv="urn:schemas-microsoft-com:mac:vml" xmlns:p14="http://schemas.microsoft.com/office/powerpoint/2010/main" xmlns:p="http://schemas.openxmlformats.org/presentationml/2006/main" xmlns:r="http://schemas.openxmlformats.org/officeDocument/2006/relationships" xmlns:a="http://schemas.openxmlformats.org/drawingml/2006/main" xmlns="" val="3507027646"/>
+        <p14:creationId xmlns="" xmlns:a="http://schemas.openxmlformats.org/drawingml/2006/main" xmlns:r="http://schemas.openxmlformats.org/officeDocument/2006/relationships" xmlns:p="http://schemas.openxmlformats.org/presentationml/2006/main" xmlns:p14="http://schemas.microsoft.com/office/powerpoint/2010/main" xmlns:mv="urn:schemas-microsoft-com:mac:vml" xmlns:mc="http://schemas.openxmlformats.org/markup-compatibility/2006" val="3507027646"/>
       </p:ext>
     </p:extLst>
   </p:cSld>
@@ -6453,7 +6453,7 @@
           <a:blip r:embed="rId2">
             <a:extLst>
               <a:ext uri="{28A0092B-C50C-407E-A947-70E740481C1C}">
-                <a14:useLocalDpi xmlns:mc="http://schemas.openxmlformats.org/markup-compatibility/2006" xmlns:mv="urn:schemas-microsoft-com:mac:vml" xmlns:a14="http://schemas.microsoft.com/office/drawing/2010/main" xmlns:p="http://schemas.openxmlformats.org/presentationml/2006/main" xmlns:r="http://schemas.openxmlformats.org/officeDocument/2006/relationships" xmlns:a="http://schemas.openxmlformats.org/drawingml/2006/main" xmlns="" val="0"/>
+                <a14:useLocalDpi xmlns="" xmlns:a="http://schemas.openxmlformats.org/drawingml/2006/main" xmlns:r="http://schemas.openxmlformats.org/officeDocument/2006/relationships" xmlns:p="http://schemas.openxmlformats.org/presentationml/2006/main" xmlns:a14="http://schemas.microsoft.com/office/drawing/2010/main" xmlns:mv="urn:schemas-microsoft-com:mac:vml" xmlns:mc="http://schemas.openxmlformats.org/markup-compatibility/2006" val="0"/>
               </a:ext>
             </a:extLst>
           </a:blip>
@@ -6473,7 +6473,7 @@
           <a:noFill/>
           <a:extLst>
             <a:ext uri="{909E8E84-426E-40DD-AFC4-6F175D3DCCD1}">
-              <a14:hiddenFill xmlns:mc="http://schemas.openxmlformats.org/markup-compatibility/2006" xmlns:mv="urn:schemas-microsoft-com:mac:vml" xmlns:a14="http://schemas.microsoft.com/office/drawing/2010/main" xmlns:p="http://schemas.openxmlformats.org/presentationml/2006/main" xmlns:r="http://schemas.openxmlformats.org/officeDocument/2006/relationships" xmlns:a="http://schemas.openxmlformats.org/drawingml/2006/main" xmlns="">
+              <a14:hiddenFill xmlns="" xmlns:a="http://schemas.openxmlformats.org/drawingml/2006/main" xmlns:r="http://schemas.openxmlformats.org/officeDocument/2006/relationships" xmlns:p="http://schemas.openxmlformats.org/presentationml/2006/main" xmlns:a14="http://schemas.microsoft.com/office/drawing/2010/main" xmlns:mv="urn:schemas-microsoft-com:mac:vml" xmlns:mc="http://schemas.openxmlformats.org/markup-compatibility/2006">
                 <a:solidFill>
                   <a:srgbClr val="FFFFFF"/>
                 </a:solidFill>
@@ -6767,7 +6767,11 @@
             </a:pPr>
             <a:r>
               <a:rPr lang="en-GB" dirty="0" smtClean="0"/>
-              <a:t>In a straight line.</a:t>
+              <a:t>In a straight line</a:t>
+            </a:r>
+            <a:r>
+              <a:rPr lang="en-GB" dirty="0" smtClean="0"/>
+              <a:t>.</a:t>
             </a:r>
           </a:p>
           <a:p>
@@ -6954,12 +6958,27 @@
             </a:pPr>
             <a:r>
               <a:rPr lang="en-GB" dirty="0" smtClean="0"/>
-              <a:t>Simulator with a physics </a:t>
+              <a:t>Simulator with a physics engine</a:t>
             </a:r>
             <a:r>
               <a:rPr lang="en-GB" dirty="0" smtClean="0"/>
-              <a:t>engine;</a:t>
-            </a:r>
+              <a:t>;</a:t>
+            </a:r>
+          </a:p>
+          <a:p>
+            <a:pPr eaLnBrk="1" hangingPunct="1">
+              <a:lnSpc>
+                <a:spcPct val="100000"/>
+              </a:lnSpc>
+              <a:spcAft>
+                <a:spcPts val="1042"/>
+              </a:spcAft>
+            </a:pPr>
+            <a:r>
+              <a:rPr lang="en-GB" dirty="0" smtClean="0"/>
+              <a:t>Initial speed (since focus on recurring stage);</a:t>
+            </a:r>
+            <a:endParaRPr lang="en-GB" dirty="0" smtClean="0"/>
           </a:p>
           <a:p>
             <a:pPr eaLnBrk="1" hangingPunct="1">
@@ -7041,7 +7060,7 @@
     </p:spTree>
     <p:extLst>
       <p:ext uri="{BB962C8B-B14F-4D97-AF65-F5344CB8AC3E}">
-        <p14:creationId xmlns:mc="http://schemas.openxmlformats.org/markup-compatibility/2006" xmlns:mv="urn:schemas-microsoft-com:mac:vml" xmlns:p14="http://schemas.microsoft.com/office/powerpoint/2010/main" xmlns:p="http://schemas.openxmlformats.org/presentationml/2006/main" xmlns:r="http://schemas.openxmlformats.org/officeDocument/2006/relationships" xmlns:a="http://schemas.openxmlformats.org/drawingml/2006/main" xmlns="" val="75972892"/>
+        <p14:creationId xmlns="" xmlns:a="http://schemas.openxmlformats.org/drawingml/2006/main" xmlns:r="http://schemas.openxmlformats.org/officeDocument/2006/relationships" xmlns:p="http://schemas.openxmlformats.org/presentationml/2006/main" xmlns:p14="http://schemas.microsoft.com/office/powerpoint/2010/main" xmlns:mv="urn:schemas-microsoft-com:mac:vml" xmlns:mc="http://schemas.openxmlformats.org/markup-compatibility/2006" val="75972892"/>
       </p:ext>
     </p:extLst>
   </p:cSld>
@@ -7174,7 +7193,25 @@
             </a:pPr>
             <a:r>
               <a:rPr lang="en-GB" dirty="0" smtClean="0"/>
-              <a:t>Simulating the robot (i.e. a stick model of the robot).</a:t>
+              <a:t>Simulating the robot (i.e. a stick model of the robot)</a:t>
+            </a:r>
+            <a:r>
+              <a:rPr lang="en-GB" dirty="0" smtClean="0"/>
+              <a:t>.</a:t>
+            </a:r>
+          </a:p>
+          <a:p>
+            <a:pPr eaLnBrk="1" hangingPunct="1">
+              <a:lnSpc>
+                <a:spcPct val="100000"/>
+              </a:lnSpc>
+              <a:spcAft>
+                <a:spcPts val="1042"/>
+              </a:spcAft>
+            </a:pPr>
+            <a:r>
+              <a:rPr lang="en-GB" dirty="0" smtClean="0"/>
+              <a:t>Should be easy to:</a:t>
             </a:r>
           </a:p>
           <a:p>
@@ -7186,20 +7223,9 @@
                 <a:spcPts val="1042"/>
               </a:spcAft>
             </a:pPr>
-            <a:endParaRPr lang="en-GB" dirty="0" smtClean="0"/>
-          </a:p>
-          <a:p>
-            <a:pPr eaLnBrk="1" hangingPunct="1">
-              <a:lnSpc>
-                <a:spcPct val="100000"/>
-              </a:lnSpc>
-              <a:spcAft>
-                <a:spcPts val="1042"/>
-              </a:spcAft>
-            </a:pPr>
             <a:r>
               <a:rPr lang="en-GB" dirty="0" smtClean="0"/>
-              <a:t>Should be easy to:</a:t>
+              <a:t>Run multiple trials;</a:t>
             </a:r>
           </a:p>
           <a:p>
@@ -7213,27 +7239,8 @@
             </a:pPr>
             <a:r>
               <a:rPr lang="en-GB" dirty="0" smtClean="0"/>
-              <a:t>R</a:t>
-            </a:r>
-            <a:r>
-              <a:rPr lang="en-GB" dirty="0" smtClean="0"/>
-              <a:t>un multiple trials;</a:t>
-            </a:r>
-          </a:p>
-          <a:p>
-            <a:pPr lvl="3" eaLnBrk="1" hangingPunct="1">
-              <a:lnSpc>
-                <a:spcPct val="100000"/>
-              </a:lnSpc>
-              <a:spcAft>
-                <a:spcPts val="1042"/>
-              </a:spcAft>
-            </a:pPr>
-            <a:r>
-              <a:rPr lang="en-GB" dirty="0" smtClean="0"/>
               <a:t>Retrieve data from the simulator (i.e. position of the robot).</a:t>
             </a:r>
-            <a:endParaRPr lang="en-GB" dirty="0" smtClean="0"/>
           </a:p>
         </p:txBody>
       </p:sp>
@@ -7264,7 +7271,7 @@
     </p:spTree>
     <p:extLst>
       <p:ext uri="{BB962C8B-B14F-4D97-AF65-F5344CB8AC3E}">
-        <p14:creationId xmlns:mc="http://schemas.openxmlformats.org/markup-compatibility/2006" xmlns:mv="urn:schemas-microsoft-com:mac:vml" xmlns:p14="http://schemas.microsoft.com/office/powerpoint/2010/main" xmlns:p="http://schemas.openxmlformats.org/presentationml/2006/main" xmlns:r="http://schemas.openxmlformats.org/officeDocument/2006/relationships" xmlns:a="http://schemas.openxmlformats.org/drawingml/2006/main" xmlns="" val="75972892"/>
+        <p14:creationId xmlns="" xmlns:a="http://schemas.openxmlformats.org/drawingml/2006/main" xmlns:r="http://schemas.openxmlformats.org/officeDocument/2006/relationships" xmlns:p="http://schemas.openxmlformats.org/presentationml/2006/main" xmlns:p14="http://schemas.microsoft.com/office/powerpoint/2010/main" xmlns:mv="urn:schemas-microsoft-com:mac:vml" xmlns:mc="http://schemas.openxmlformats.org/markup-compatibility/2006" val="75972892"/>
       </p:ext>
     </p:extLst>
   </p:cSld>
@@ -7373,7 +7380,7 @@
             </a:r>
           </a:p>
           <a:p>
-            <a:pPr lvl="4" eaLnBrk="1" hangingPunct="1">
+            <a:pPr lvl="3" eaLnBrk="1" hangingPunct="1">
               <a:lnSpc>
                 <a:spcPct val="100000"/>
               </a:lnSpc>
@@ -7383,11 +7390,11 @@
             </a:pPr>
             <a:r>
               <a:rPr lang="en-GB" dirty="0" smtClean="0"/>
-              <a:t>…</a:t>
-            </a:r>
-          </a:p>
-          <a:p>
-            <a:pPr lvl="4" eaLnBrk="1" hangingPunct="1">
+              <a:t>Increase complexity over time (keep track of genes);</a:t>
+            </a:r>
+          </a:p>
+          <a:p>
+            <a:pPr lvl="3" eaLnBrk="1" hangingPunct="1">
               <a:lnSpc>
                 <a:spcPct val="100000"/>
               </a:lnSpc>
@@ -7396,12 +7403,16 @@
               </a:spcAft>
             </a:pPr>
             <a:r>
+              <a:rPr lang="en-GB" dirty="0" err="1" smtClean="0"/>
+              <a:t>Speciating</a:t>
+            </a:r>
+            <a:r>
               <a:rPr lang="en-GB" dirty="0" smtClean="0"/>
-              <a:t>…</a:t>
-            </a:r>
-          </a:p>
-          <a:p>
-            <a:pPr lvl="4" eaLnBrk="1" hangingPunct="1">
+              <a:t> the population (compete in niches at first);</a:t>
+            </a:r>
+          </a:p>
+          <a:p>
+            <a:pPr lvl="3" eaLnBrk="1" hangingPunct="1">
               <a:lnSpc>
                 <a:spcPct val="100000"/>
               </a:lnSpc>
@@ -7411,7 +7422,7 @@
             </a:pPr>
             <a:r>
               <a:rPr lang="en-GB" dirty="0" smtClean="0"/>
-              <a:t>…</a:t>
+              <a:t>Initially uniform population.</a:t>
             </a:r>
           </a:p>
           <a:p>
@@ -7429,7 +7440,39 @@
             </a:r>
             <a:r>
               <a:rPr lang="en-GB" dirty="0" smtClean="0"/>
+              <a:t> (extension of NEAT)</a:t>
+            </a:r>
+            <a:r>
+              <a:rPr lang="en-GB" dirty="0" smtClean="0"/>
               <a:t>:</a:t>
+            </a:r>
+          </a:p>
+          <a:p>
+            <a:pPr lvl="3" eaLnBrk="1" hangingPunct="1">
+              <a:lnSpc>
+                <a:spcPct val="100000"/>
+              </a:lnSpc>
+              <a:spcAft>
+                <a:spcPts val="1042"/>
+              </a:spcAft>
+            </a:pPr>
+            <a:r>
+              <a:rPr lang="en-GB" dirty="0" smtClean="0"/>
+              <a:t>Learn regularities (i.e. similarity or repeating patterns);</a:t>
+            </a:r>
+          </a:p>
+          <a:p>
+            <a:pPr lvl="3" eaLnBrk="1" hangingPunct="1">
+              <a:lnSpc>
+                <a:spcPct val="100000"/>
+              </a:lnSpc>
+              <a:spcAft>
+                <a:spcPts val="1042"/>
+              </a:spcAft>
+            </a:pPr>
+            <a:r>
+              <a:rPr lang="en-GB" dirty="0" smtClean="0"/>
+              <a:t>Input and output placement.</a:t>
             </a:r>
           </a:p>
           <a:p>
@@ -7472,7 +7515,7 @@
     </p:spTree>
     <p:extLst>
       <p:ext uri="{BB962C8B-B14F-4D97-AF65-F5344CB8AC3E}">
-        <p14:creationId xmlns:mc="http://schemas.openxmlformats.org/markup-compatibility/2006" xmlns:mv="urn:schemas-microsoft-com:mac:vml" xmlns:p14="http://schemas.microsoft.com/office/powerpoint/2010/main" xmlns:p="http://schemas.openxmlformats.org/presentationml/2006/main" xmlns:r="http://schemas.openxmlformats.org/officeDocument/2006/relationships" xmlns:a="http://schemas.openxmlformats.org/drawingml/2006/main" xmlns="" val="75972892"/>
+        <p14:creationId xmlns="" xmlns:a="http://schemas.openxmlformats.org/drawingml/2006/main" xmlns:r="http://schemas.openxmlformats.org/officeDocument/2006/relationships" xmlns:p="http://schemas.openxmlformats.org/presentationml/2006/main" xmlns:p14="http://schemas.microsoft.com/office/powerpoint/2010/main" xmlns:mv="urn:schemas-microsoft-com:mac:vml" xmlns:mc="http://schemas.openxmlformats.org/markup-compatibility/2006" val="75972892"/>
       </p:ext>
     </p:extLst>
   </p:cSld>
@@ -7577,11 +7620,16 @@
             </a:pPr>
             <a:r>
               <a:rPr lang="en-GB" dirty="0" smtClean="0"/>
-              <a:t>Mapping:</a:t>
-            </a:r>
-          </a:p>
-          <a:p>
-            <a:pPr lvl="4" eaLnBrk="1" hangingPunct="1">
+              <a:t>Mapping</a:t>
+            </a:r>
+            <a:r>
+              <a:rPr lang="en-GB" dirty="0" smtClean="0"/>
+              <a:t>:</a:t>
+            </a:r>
+            <a:endParaRPr lang="en-GB" dirty="0" smtClean="0"/>
+          </a:p>
+          <a:p>
+            <a:pPr lvl="3" eaLnBrk="1" hangingPunct="1">
               <a:lnSpc>
                 <a:spcPct val="100000"/>
               </a:lnSpc>
@@ -7591,11 +7639,11 @@
             </a:pPr>
             <a:r>
               <a:rPr lang="en-GB" dirty="0" smtClean="0"/>
-              <a:t>All joint jaw and pitch.</a:t>
-            </a:r>
-          </a:p>
-          <a:p>
-            <a:pPr lvl="4" eaLnBrk="1" hangingPunct="1">
+              <a:t>Initially only leg joints jaw and pitch (possibly extending with other joints, i.e. arms);</a:t>
+            </a:r>
+          </a:p>
+          <a:p>
+            <a:pPr lvl="3" eaLnBrk="1" hangingPunct="1">
               <a:lnSpc>
                 <a:spcPct val="100000"/>
               </a:lnSpc>
@@ -7605,8 +7653,122 @@
             </a:pPr>
             <a:r>
               <a:rPr lang="en-GB" dirty="0" smtClean="0"/>
-              <a:t>…</a:t>
-            </a:r>
+              <a:t>Time steps of 100 ms.</a:t>
+            </a:r>
+          </a:p>
+          <a:p>
+            <a:pPr eaLnBrk="1" hangingPunct="1">
+              <a:lnSpc>
+                <a:spcPct val="100000"/>
+              </a:lnSpc>
+              <a:spcAft>
+                <a:spcPts val="1042"/>
+              </a:spcAft>
+            </a:pPr>
+            <a:r>
+              <a:rPr lang="en-GB" dirty="0" smtClean="0"/>
+              <a:t>Fitness:</a:t>
+            </a:r>
+          </a:p>
+          <a:p>
+            <a:pPr lvl="1" eaLnBrk="1" hangingPunct="1">
+              <a:lnSpc>
+                <a:spcPct val="100000"/>
+              </a:lnSpc>
+              <a:spcAft>
+                <a:spcPts val="1042"/>
+              </a:spcAft>
+            </a:pPr>
+            <a:r>
+              <a:rPr lang="en-GB" dirty="0" err="1" smtClean="0"/>
+              <a:t>Maximalization</a:t>
+            </a:r>
+            <a:r>
+              <a:rPr lang="en-GB" smtClean="0"/>
+              <a:t> within N </a:t>
+            </a:r>
+            <a:r>
+              <a:rPr lang="en-GB" dirty="0" smtClean="0"/>
+              <a:t>seconds;</a:t>
+            </a:r>
+          </a:p>
+          <a:p>
+            <a:pPr lvl="1" eaLnBrk="1" hangingPunct="1">
+              <a:lnSpc>
+                <a:spcPct val="100000"/>
+              </a:lnSpc>
+              <a:spcAft>
+                <a:spcPts val="1042"/>
+              </a:spcAft>
+            </a:pPr>
+            <a:r>
+              <a:rPr lang="en-GB" dirty="0" smtClean="0"/>
+              <a:t>Falling over means minimal fitness;</a:t>
+            </a:r>
+          </a:p>
+          <a:p>
+            <a:pPr lvl="1" eaLnBrk="1" hangingPunct="1">
+              <a:lnSpc>
+                <a:spcPct val="100000"/>
+              </a:lnSpc>
+              <a:spcAft>
+                <a:spcPts val="1042"/>
+              </a:spcAft>
+            </a:pPr>
+            <a:r>
+              <a:rPr lang="en-GB" dirty="0" smtClean="0"/>
+              <a:t>Properties:</a:t>
+            </a:r>
+          </a:p>
+          <a:p>
+            <a:pPr lvl="3" eaLnBrk="1" hangingPunct="1">
+              <a:lnSpc>
+                <a:spcPct val="100000"/>
+              </a:lnSpc>
+              <a:spcAft>
+                <a:spcPts val="1042"/>
+              </a:spcAft>
+            </a:pPr>
+            <a:r>
+              <a:rPr lang="en-GB" dirty="0" smtClean="0"/>
+              <a:t>Distance;</a:t>
+            </a:r>
+          </a:p>
+          <a:p>
+            <a:pPr lvl="3" eaLnBrk="1" hangingPunct="1">
+              <a:lnSpc>
+                <a:spcPct val="100000"/>
+              </a:lnSpc>
+              <a:spcAft>
+                <a:spcPts val="1042"/>
+              </a:spcAft>
+            </a:pPr>
+            <a:r>
+              <a:rPr lang="en-GB" dirty="0" smtClean="0"/>
+              <a:t>Speed.</a:t>
+            </a:r>
+          </a:p>
+          <a:p>
+            <a:pPr lvl="3" eaLnBrk="1" hangingPunct="1">
+              <a:lnSpc>
+                <a:spcPct val="100000"/>
+              </a:lnSpc>
+              <a:spcAft>
+                <a:spcPts val="1042"/>
+              </a:spcAft>
+            </a:pPr>
+            <a:endParaRPr lang="en-GB" dirty="0" smtClean="0"/>
+          </a:p>
+          <a:p>
+            <a:pPr lvl="3" eaLnBrk="1" hangingPunct="1">
+              <a:lnSpc>
+                <a:spcPct val="100000"/>
+              </a:lnSpc>
+              <a:spcAft>
+                <a:spcPts val="1042"/>
+              </a:spcAft>
+              <a:buNone/>
+            </a:pPr>
             <a:endParaRPr lang="en-GB" dirty="0" smtClean="0"/>
           </a:p>
         </p:txBody>
@@ -7638,7 +7800,7 @@
     </p:spTree>
     <p:extLst>
       <p:ext uri="{BB962C8B-B14F-4D97-AF65-F5344CB8AC3E}">
-        <p14:creationId xmlns:mc="http://schemas.openxmlformats.org/markup-compatibility/2006" xmlns:mv="urn:schemas-microsoft-com:mac:vml" xmlns:p14="http://schemas.microsoft.com/office/powerpoint/2010/main" xmlns:p="http://schemas.openxmlformats.org/presentationml/2006/main" xmlns:r="http://schemas.openxmlformats.org/officeDocument/2006/relationships" xmlns:a="http://schemas.openxmlformats.org/drawingml/2006/main" xmlns="" val="75972892"/>
+        <p14:creationId xmlns="" xmlns:a="http://schemas.openxmlformats.org/drawingml/2006/main" xmlns:r="http://schemas.openxmlformats.org/officeDocument/2006/relationships" xmlns:p="http://schemas.openxmlformats.org/presentationml/2006/main" xmlns:p14="http://schemas.microsoft.com/office/powerpoint/2010/main" xmlns:mv="urn:schemas-microsoft-com:mac:vml" xmlns:mc="http://schemas.openxmlformats.org/markup-compatibility/2006" val="75972892"/>
       </p:ext>
     </p:extLst>
   </p:cSld>
@@ -7802,7 +7964,11 @@
             </a:r>
             <a:r>
               <a:rPr lang="en-US" sz="1200" dirty="0" smtClean="0"/>
-              <a:t> (2012)</a:t>
+              <a:t> (2012</a:t>
+            </a:r>
+            <a:r>
+              <a:rPr lang="en-US" sz="1200" dirty="0" smtClean="0"/>
+              <a:t>)</a:t>
             </a:r>
             <a:endParaRPr lang="en-GB" sz="1200" dirty="0" smtClean="0"/>
           </a:p>
@@ -7816,12 +7982,16 @@
               </a:spcAft>
             </a:pPr>
             <a:r>
-              <a:rPr lang="en-US" dirty="0"/>
-              <a:t>Gait Evolution for Humanoid Robot in a Physically Simulated </a:t>
-            </a:r>
-            <a:r>
               <a:rPr lang="en-US" dirty="0" smtClean="0"/>
-              <a:t>Environment </a:t>
+              <a:t>Evolving Robot Gaits in Hardware: the </a:t>
+            </a:r>
+            <a:r>
+              <a:rPr lang="en-US" dirty="0" err="1" smtClean="0"/>
+              <a:t>HyperNEAT</a:t>
+            </a:r>
+            <a:r>
+              <a:rPr lang="en-US" dirty="0" smtClean="0"/>
+              <a:t> Generative Encoding Vs. Parameter Optimization</a:t>
             </a:r>
           </a:p>
           <a:p>
@@ -7835,65 +8005,78 @@
               <a:buNone/>
             </a:pPr>
             <a:r>
-              <a:rPr lang="en-US" dirty="0"/>
+              <a:rPr lang="en-US" dirty="0" smtClean="0"/>
               <a:t>	</a:t>
             </a:r>
             <a:r>
+              <a:rPr lang="en-US" sz="1200" dirty="0"/>
+              <a:t>Jason </a:t>
+            </a:r>
+            <a:r>
               <a:rPr lang="en-US" sz="1200" dirty="0" err="1" smtClean="0"/>
-              <a:t>Nesrine</a:t>
+              <a:t>Yosinski</a:t>
             </a:r>
             <a:r>
               <a:rPr lang="en-US" sz="1200" dirty="0" smtClean="0"/>
-              <a:t> </a:t>
+              <a:t>, </a:t>
+            </a:r>
+            <a:r>
+              <a:rPr lang="en-US" sz="1200" dirty="0"/>
+              <a:t>Jeff </a:t>
+            </a:r>
+            <a:r>
+              <a:rPr lang="en-US" sz="1200" dirty="0" err="1" smtClean="0"/>
+              <a:t>Clune</a:t>
+            </a:r>
+            <a:r>
+              <a:rPr lang="en-US" sz="1200" dirty="0" smtClean="0"/>
+              <a:t>, </a:t>
+            </a:r>
+            <a:r>
+              <a:rPr lang="en-US" sz="1200" dirty="0"/>
+              <a:t>Diana </a:t>
+            </a:r>
+            <a:r>
+              <a:rPr lang="en-US" sz="1200" dirty="0" smtClean="0"/>
+              <a:t>Hidalgo, </a:t>
+            </a:r>
+            <a:r>
+              <a:rPr lang="en-US" sz="1200" dirty="0"/>
+              <a:t>Sarah </a:t>
+            </a:r>
+            <a:r>
+              <a:rPr lang="en-US" sz="1200" dirty="0" smtClean="0"/>
+              <a:t>Nguyen, </a:t>
+            </a:r>
+            <a:r>
+              <a:rPr lang="en-US" sz="1200" dirty="0"/>
+              <a:t>Juan Cristobal </a:t>
+            </a:r>
+            <a:r>
+              <a:rPr lang="en-US" sz="1200" dirty="0" err="1" smtClean="0"/>
+              <a:t>Zagal</a:t>
+            </a:r>
+            <a:r>
+              <a:rPr lang="en-US" sz="1200" dirty="0" smtClean="0"/>
+              <a:t>, </a:t>
+            </a:r>
+            <a:r>
+              <a:rPr lang="en-US" sz="1200" dirty="0"/>
+              <a:t>and </a:t>
             </a:r>
             <a:r>
               <a:rPr lang="en-US" sz="1200" dirty="0" err="1"/>
-              <a:t>Ouannes</a:t>
-            </a:r>
-            <a:r>
-              <a:rPr lang="en-US" sz="1200" dirty="0"/>
-              <a:t>, </a:t>
-            </a:r>
-            <a:r>
-              <a:rPr lang="en-US" sz="1200" dirty="0" err="1"/>
-              <a:t>NourEddine</a:t>
+              <a:t>Hod</a:t>
             </a:r>
             <a:r>
               <a:rPr lang="en-US" sz="1200" dirty="0"/>
               <a:t> </a:t>
             </a:r>
             <a:r>
-              <a:rPr lang="en-US" sz="1200" dirty="0" err="1"/>
-              <a:t>Djedi</a:t>
-            </a:r>
-            <a:r>
-              <a:rPr lang="en-US" sz="1200" dirty="0"/>
-              <a:t>, Yves </a:t>
-            </a:r>
-            <a:r>
-              <a:rPr lang="en-US" sz="1200" dirty="0" err="1"/>
-              <a:t>Duthen</a:t>
-            </a:r>
-            <a:r>
-              <a:rPr lang="en-US" sz="1200" dirty="0"/>
-              <a:t> and </a:t>
-            </a:r>
-            <a:r>
-              <a:rPr lang="en-US" sz="1200" dirty="0" err="1"/>
-              <a:t>Hervé</a:t>
-            </a:r>
-            <a:r>
-              <a:rPr lang="en-US" sz="1200" dirty="0"/>
-              <a:t> </a:t>
-            </a:r>
-            <a:r>
-              <a:rPr lang="en-US" sz="1200" dirty="0" err="1" smtClean="0"/>
-              <a:t>Luga</a:t>
-            </a:r>
-            <a:r>
               <a:rPr lang="en-US" sz="1200" dirty="0" smtClean="0"/>
-              <a:t> (2011)</a:t>
-            </a:r>
+              <a:t>Lipson (2011)</a:t>
+            </a:r>
+            <a:endParaRPr lang="en-US" sz="1200" dirty="0"/>
           </a:p>
           <a:p>
             <a:pPr eaLnBrk="1" hangingPunct="1">
@@ -7905,20 +8088,8 @@
               </a:spcAft>
             </a:pPr>
             <a:r>
-              <a:rPr lang="en-US" dirty="0"/>
-              <a:t>Evolving Robot Gaits in Hardware: the </a:t>
-            </a:r>
-            <a:r>
-              <a:rPr lang="en-US" dirty="0" err="1"/>
-              <a:t>HyperNEAT</a:t>
-            </a:r>
-            <a:r>
-              <a:rPr lang="en-US" dirty="0"/>
-              <a:t> Generative Encoding </a:t>
-            </a:r>
-            <a:r>
               <a:rPr lang="en-US" dirty="0" smtClean="0"/>
-              <a:t>Vs. Parameter Optimization</a:t>
+              <a:t>A Step Toward Evolving Biped Walking Behavior Through Indirect Encoding</a:t>
             </a:r>
           </a:p>
           <a:p>
@@ -7936,74 +8107,13 @@
               <a:t>	</a:t>
             </a:r>
             <a:r>
-              <a:rPr lang="en-US" sz="1200" dirty="0"/>
-              <a:t>Jason </a:t>
-            </a:r>
-            <a:r>
-              <a:rPr lang="en-US" sz="1200" dirty="0" err="1" smtClean="0"/>
-              <a:t>Yosinski</a:t>
-            </a:r>
-            <a:r>
               <a:rPr lang="en-US" sz="1200" dirty="0" smtClean="0"/>
-              <a:t>, </a:t>
-            </a:r>
-            <a:r>
-              <a:rPr lang="en-US" sz="1200" dirty="0"/>
-              <a:t>Jeff </a:t>
-            </a:r>
-            <a:r>
-              <a:rPr lang="en-US" sz="1200" dirty="0" err="1" smtClean="0"/>
-              <a:t>Clune</a:t>
+              <a:t>Randal Olsen (2010</a:t>
             </a:r>
             <a:r>
               <a:rPr lang="en-US" sz="1200" dirty="0" smtClean="0"/>
-              <a:t>, </a:t>
-            </a:r>
-            <a:r>
-              <a:rPr lang="en-US" sz="1200" dirty="0"/>
-              <a:t>Diana </a:t>
-            </a:r>
-            <a:r>
-              <a:rPr lang="en-US" sz="1200" dirty="0" smtClean="0"/>
-              <a:t>Hidalgo, </a:t>
-            </a:r>
-            <a:r>
-              <a:rPr lang="en-US" sz="1200" dirty="0"/>
-              <a:t>Sarah </a:t>
-            </a:r>
-            <a:r>
-              <a:rPr lang="en-US" sz="1200" dirty="0" smtClean="0"/>
-              <a:t>Nguyen, </a:t>
-            </a:r>
-            <a:r>
-              <a:rPr lang="en-US" sz="1200" dirty="0"/>
-              <a:t>Juan Cristobal </a:t>
-            </a:r>
-            <a:r>
-              <a:rPr lang="en-US" sz="1200" dirty="0" err="1" smtClean="0"/>
-              <a:t>Zagal</a:t>
-            </a:r>
-            <a:r>
-              <a:rPr lang="en-US" sz="1200" dirty="0" smtClean="0"/>
-              <a:t>, </a:t>
-            </a:r>
-            <a:r>
-              <a:rPr lang="en-US" sz="1200" dirty="0"/>
-              <a:t>and </a:t>
-            </a:r>
-            <a:r>
-              <a:rPr lang="en-US" sz="1200" dirty="0" err="1"/>
-              <a:t>Hod</a:t>
-            </a:r>
-            <a:r>
-              <a:rPr lang="en-US" sz="1200" dirty="0"/>
-              <a:t> </a:t>
-            </a:r>
-            <a:r>
-              <a:rPr lang="en-US" sz="1200" dirty="0" smtClean="0"/>
-              <a:t>Lipson (2011)</a:t>
-            </a:r>
-            <a:endParaRPr lang="en-US" sz="1200" dirty="0"/>
+              <a:t>)</a:t>
+            </a:r>
           </a:p>
           <a:p>
             <a:pPr eaLnBrk="1" hangingPunct="1">
@@ -8016,7 +8126,7 @@
             </a:pPr>
             <a:r>
               <a:rPr lang="en-US" dirty="0" smtClean="0"/>
-              <a:t>A Step Toward Evolving Biped Walking Behavior Through Indirect Encoding</a:t>
+              <a:t>Gait Evolution for Humanoid Robot in a Physically Simulated Environment </a:t>
             </a:r>
           </a:p>
           <a:p>
@@ -8030,14 +8140,70 @@
               <a:buNone/>
             </a:pPr>
             <a:r>
-              <a:rPr lang="en-US" dirty="0"/>
+              <a:rPr lang="en-US" dirty="0" smtClean="0"/>
               <a:t>	</a:t>
             </a:r>
             <a:r>
+              <a:rPr lang="en-US" sz="1200" dirty="0" err="1" smtClean="0"/>
+              <a:t>Nesrine</a:t>
+            </a:r>
+            <a:r>
               <a:rPr lang="en-US" sz="1200" dirty="0" smtClean="0"/>
-              <a:t>Randal Olsen (2010)</a:t>
-            </a:r>
-            <a:endParaRPr lang="en-GB" dirty="0" smtClean="0"/>
+              <a:t> </a:t>
+            </a:r>
+            <a:r>
+              <a:rPr lang="en-US" sz="1200" dirty="0" err="1" smtClean="0"/>
+              <a:t>Ouannes</a:t>
+            </a:r>
+            <a:r>
+              <a:rPr lang="en-US" sz="1200" dirty="0" smtClean="0"/>
+              <a:t>, </a:t>
+            </a:r>
+            <a:r>
+              <a:rPr lang="en-US" sz="1200" dirty="0" err="1" smtClean="0"/>
+              <a:t>NourEddine</a:t>
+            </a:r>
+            <a:r>
+              <a:rPr lang="en-US" sz="1200" dirty="0" smtClean="0"/>
+              <a:t> </a:t>
+            </a:r>
+            <a:r>
+              <a:rPr lang="en-US" sz="1200" dirty="0" err="1" smtClean="0"/>
+              <a:t>Djedi</a:t>
+            </a:r>
+            <a:r>
+              <a:rPr lang="en-US" sz="1200" dirty="0" smtClean="0"/>
+              <a:t>, Yves </a:t>
+            </a:r>
+            <a:r>
+              <a:rPr lang="en-US" sz="1200" dirty="0" err="1" smtClean="0"/>
+              <a:t>Duthen</a:t>
+            </a:r>
+            <a:r>
+              <a:rPr lang="en-US" sz="1200" dirty="0" smtClean="0"/>
+              <a:t> and </a:t>
+            </a:r>
+            <a:r>
+              <a:rPr lang="en-US" sz="1200" dirty="0" err="1" smtClean="0"/>
+              <a:t>Hervé</a:t>
+            </a:r>
+            <a:r>
+              <a:rPr lang="en-US" sz="1200" dirty="0" smtClean="0"/>
+              <a:t> </a:t>
+            </a:r>
+            <a:r>
+              <a:rPr lang="en-US" sz="1200" dirty="0" err="1" smtClean="0"/>
+              <a:t>Luga</a:t>
+            </a:r>
+            <a:r>
+              <a:rPr lang="en-US" sz="1200" dirty="0" smtClean="0"/>
+              <a:t> (2011</a:t>
+            </a:r>
+            <a:r>
+              <a:rPr lang="en-US" sz="1200" dirty="0" smtClean="0"/>
+              <a:t>)</a:t>
+            </a:r>
+            <a:endParaRPr lang="en-US" sz="1200" dirty="0" smtClean="0"/>
           </a:p>
         </p:txBody>
       </p:sp>
@@ -8068,7 +8234,7 @@
     </p:spTree>
     <p:extLst>
       <p:ext uri="{BB962C8B-B14F-4D97-AF65-F5344CB8AC3E}">
-        <p14:creationId xmlns:mc="http://schemas.openxmlformats.org/markup-compatibility/2006" xmlns:mv="urn:schemas-microsoft-com:mac:vml" xmlns:p14="http://schemas.microsoft.com/office/powerpoint/2010/main" xmlns:p="http://schemas.openxmlformats.org/presentationml/2006/main" xmlns:r="http://schemas.openxmlformats.org/officeDocument/2006/relationships" xmlns:a="http://schemas.openxmlformats.org/drawingml/2006/main" xmlns="" val="3886637528"/>
+        <p14:creationId xmlns="" xmlns:a="http://schemas.openxmlformats.org/drawingml/2006/main" xmlns:r="http://schemas.openxmlformats.org/officeDocument/2006/relationships" xmlns:p="http://schemas.openxmlformats.org/presentationml/2006/main" xmlns:p14="http://schemas.microsoft.com/office/powerpoint/2010/main" xmlns:mv="urn:schemas-microsoft-com:mac:vml" xmlns:mc="http://schemas.openxmlformats.org/markup-compatibility/2006" val="3886637528"/>
       </p:ext>
     </p:extLst>
   </p:cSld>
@@ -8202,7 +8368,7 @@
     </p:spTree>
     <p:extLst>
       <p:ext uri="{BB962C8B-B14F-4D97-AF65-F5344CB8AC3E}">
-        <p14:creationId xmlns:mc="http://schemas.openxmlformats.org/markup-compatibility/2006" xmlns:mv="urn:schemas-microsoft-com:mac:vml" xmlns:p14="http://schemas.microsoft.com/office/powerpoint/2010/main" xmlns:p="http://schemas.openxmlformats.org/presentationml/2006/main" xmlns:r="http://schemas.openxmlformats.org/officeDocument/2006/relationships" xmlns:a="http://schemas.openxmlformats.org/drawingml/2006/main" xmlns="" val="201712783"/>
+        <p14:creationId xmlns="" xmlns:a="http://schemas.openxmlformats.org/drawingml/2006/main" xmlns:r="http://schemas.openxmlformats.org/officeDocument/2006/relationships" xmlns:p="http://schemas.openxmlformats.org/presentationml/2006/main" xmlns:p14="http://schemas.microsoft.com/office/powerpoint/2010/main" xmlns:mv="urn:schemas-microsoft-com:mac:vml" xmlns:mc="http://schemas.openxmlformats.org/markup-compatibility/2006" val="201712783"/>
       </p:ext>
     </p:extLst>
   </p:cSld>

</xml_diff>

<commit_message>
Updated presentation with speaker notes
</commit_message>
<xml_diff>
--- a/Documents/Presentations/Presentation Evolutionary Algorithms.pptx
+++ b/Documents/Presentations/Presentation Evolutionary Algorithms.pptx
@@ -6,20 +6,21 @@
     <p:sldMasterId r:id="rId2"/>
   </p:sldMasterIdLst>
   <p:notesMasterIdLst>
-    <p:notesMasterId r:id="rId11"/>
+    <p:notesMasterId r:id="rId12"/>
   </p:notesMasterIdLst>
   <p:handoutMasterIdLst>
-    <p:handoutMasterId r:id="rId12"/>
+    <p:handoutMasterId r:id="rId13"/>
   </p:handoutMasterIdLst>
   <p:sldIdLst>
     <p:sldId id="344" r:id="rId3"/>
     <p:sldId id="354" r:id="rId4"/>
-    <p:sldId id="355" r:id="rId5"/>
-    <p:sldId id="361" r:id="rId6"/>
-    <p:sldId id="360" r:id="rId7"/>
-    <p:sldId id="362" r:id="rId8"/>
-    <p:sldId id="358" r:id="rId9"/>
-    <p:sldId id="357" r:id="rId10"/>
+    <p:sldId id="363" r:id="rId5"/>
+    <p:sldId id="355" r:id="rId6"/>
+    <p:sldId id="361" r:id="rId7"/>
+    <p:sldId id="360" r:id="rId8"/>
+    <p:sldId id="362" r:id="rId9"/>
+    <p:sldId id="358" r:id="rId10"/>
+    <p:sldId id="357" r:id="rId11"/>
   </p:sldIdLst>
   <p:sldSz cx="9906000" cy="6858000" type="A4"/>
   <p:notesSz cx="6858000" cy="9144000"/>
@@ -355,7 +356,7 @@
     </p:spTree>
     <p:extLst>
       <p:ext uri="{BB962C8B-B14F-4D97-AF65-F5344CB8AC3E}">
-        <p14:creationId xmlns:mc="http://schemas.openxmlformats.org/markup-compatibility/2006" xmlns:mv="urn:schemas-microsoft-com:mac:vml" xmlns:p14="http://schemas.microsoft.com/office/powerpoint/2010/main" xmlns:p="http://schemas.openxmlformats.org/presentationml/2006/main" xmlns:r="http://schemas.openxmlformats.org/officeDocument/2006/relationships" xmlns:a="http://schemas.openxmlformats.org/drawingml/2006/main" xmlns="" val="2414635666"/>
+        <p14:creationId xmlns="" xmlns:a="http://schemas.openxmlformats.org/drawingml/2006/main" xmlns:r="http://schemas.openxmlformats.org/officeDocument/2006/relationships" xmlns:p="http://schemas.openxmlformats.org/presentationml/2006/main" xmlns:p14="http://schemas.microsoft.com/office/powerpoint/2010/main" xmlns:mv="urn:schemas-microsoft-com:mac:vml" xmlns:mc="http://schemas.openxmlformats.org/markup-compatibility/2006" val="2414635666"/>
       </p:ext>
     </p:extLst>
   </p:cSld>
@@ -654,7 +655,7 @@
     </p:spTree>
     <p:extLst>
       <p:ext uri="{BB962C8B-B14F-4D97-AF65-F5344CB8AC3E}">
-        <p14:creationId xmlns:mc="http://schemas.openxmlformats.org/markup-compatibility/2006" xmlns:mv="urn:schemas-microsoft-com:mac:vml" xmlns:p14="http://schemas.microsoft.com/office/powerpoint/2010/main" xmlns:p="http://schemas.openxmlformats.org/presentationml/2006/main" xmlns:r="http://schemas.openxmlformats.org/officeDocument/2006/relationships" xmlns:a="http://schemas.openxmlformats.org/drawingml/2006/main" xmlns="" val="3507027646"/>
+        <p14:creationId xmlns="" xmlns:a="http://schemas.openxmlformats.org/drawingml/2006/main" xmlns:r="http://schemas.openxmlformats.org/officeDocument/2006/relationships" xmlns:p="http://schemas.openxmlformats.org/presentationml/2006/main" xmlns:p14="http://schemas.microsoft.com/office/powerpoint/2010/main" xmlns:mv="urn:schemas-microsoft-com:mac:vml" xmlns:mc="http://schemas.openxmlformats.org/markup-compatibility/2006" val="3507027646"/>
       </p:ext>
     </p:extLst>
   </p:cSld>
@@ -783,6 +784,619 @@
     </a:lvl9pPr>
   </p:notesStyle>
 </p:notesMaster>
+</file>
+
+<file path=ppt/notesSlides/notesSlide1.xml><?xml version="1.0" encoding="utf-8"?>
+<p:notes xmlns:a="http://schemas.openxmlformats.org/drawingml/2006/main" xmlns:r="http://schemas.openxmlformats.org/officeDocument/2006/relationships" xmlns:mc="http://schemas.openxmlformats.org/markup-compatibility/2006" xmlns:mv="urn:schemas-microsoft-com:mac:vml" xmlns:p="http://schemas.openxmlformats.org/presentationml/2006/main" mc:Ignorable="mv" mc:PreserveAttributes="mv:*">
+  <p:cSld>
+    <p:spTree>
+      <p:nvGrpSpPr>
+        <p:cNvPr id="1" name=""/>
+        <p:cNvGrpSpPr/>
+        <p:nvPr/>
+      </p:nvGrpSpPr>
+      <p:grpSpPr>
+        <a:xfrm>
+          <a:off x="0" y="0"/>
+          <a:ext cx="0" cy="0"/>
+          <a:chOff x="0" y="0"/>
+          <a:chExt cx="0" cy="0"/>
+        </a:xfrm>
+      </p:grpSpPr>
+      <p:sp>
+        <p:nvSpPr>
+          <p:cNvPr id="2" name="Slide Image Placeholder 1"/>
+          <p:cNvSpPr>
+            <a:spLocks noGrp="1" noRot="1" noChangeAspect="1"/>
+          </p:cNvSpPr>
+          <p:nvPr>
+            <p:ph type="sldImg"/>
+          </p:nvPr>
+        </p:nvSpPr>
+        <p:spPr/>
+      </p:sp>
+      <p:sp>
+        <p:nvSpPr>
+          <p:cNvPr id="3" name="Notes Placeholder 2"/>
+          <p:cNvSpPr>
+            <a:spLocks noGrp="1"/>
+          </p:cNvSpPr>
+          <p:nvPr>
+            <p:ph type="body" idx="1"/>
+          </p:nvPr>
+        </p:nvSpPr>
+        <p:spPr/>
+        <p:txBody>
+          <a:bodyPr>
+            <a:normAutofit/>
+          </a:bodyPr>
+          <a:lstStyle/>
+          <a:p>
+            <a:r>
+              <a:rPr lang="en-GB" dirty="0" smtClean="0"/>
+              <a:t>Why ice skating?</a:t>
+            </a:r>
+          </a:p>
+          <a:p>
+            <a:r>
+              <a:rPr lang="en-GB" dirty="0" smtClean="0"/>
+              <a:t>	Not yet</a:t>
+            </a:r>
+            <a:r>
+              <a:rPr lang="en-GB" baseline="0" dirty="0" smtClean="0"/>
+              <a:t> done.</a:t>
+            </a:r>
+          </a:p>
+          <a:p>
+            <a:r>
+              <a:rPr lang="en-GB" baseline="0" dirty="0" smtClean="0"/>
+              <a:t>	‘How can robots move on uneven surfaces?’</a:t>
+            </a:r>
+          </a:p>
+          <a:p>
+            <a:endParaRPr lang="en-GB" baseline="0" dirty="0" smtClean="0"/>
+          </a:p>
+          <a:p>
+            <a:r>
+              <a:rPr lang="en-GB" baseline="0" dirty="0" smtClean="0"/>
+              <a:t>Why evolutionary methods?</a:t>
+            </a:r>
+          </a:p>
+          <a:p>
+            <a:r>
+              <a:rPr lang="en-GB" baseline="0" dirty="0" smtClean="0"/>
+              <a:t>	Little human programming</a:t>
+            </a:r>
+          </a:p>
+          <a:p>
+            <a:r>
+              <a:rPr lang="en-GB" baseline="0" dirty="0" smtClean="0"/>
+              <a:t>	Proven to work for quadrupeds</a:t>
+            </a:r>
+          </a:p>
+          <a:p>
+            <a:endParaRPr lang="en-GB" baseline="0" dirty="0" smtClean="0"/>
+          </a:p>
+          <a:p>
+            <a:r>
+              <a:rPr lang="en-GB" baseline="0" dirty="0" smtClean="0"/>
+              <a:t>Why </a:t>
+            </a:r>
+            <a:r>
+              <a:rPr lang="en-GB" baseline="0" dirty="0" err="1" smtClean="0"/>
+              <a:t>Nao</a:t>
+            </a:r>
+            <a:r>
+              <a:rPr lang="en-GB" baseline="0" dirty="0" smtClean="0"/>
+              <a:t>?</a:t>
+            </a:r>
+          </a:p>
+          <a:p>
+            <a:r>
+              <a:rPr lang="en-GB" baseline="0" dirty="0" smtClean="0"/>
+              <a:t>	Because it’s available</a:t>
+            </a:r>
+          </a:p>
+          <a:p>
+            <a:endParaRPr lang="en-GB" baseline="0" dirty="0" smtClean="0"/>
+          </a:p>
+          <a:p>
+            <a:r>
+              <a:rPr lang="en-GB" baseline="0" dirty="0" smtClean="0"/>
+              <a:t>No skates &amp; straight lines: simplicity &amp; easier balancing</a:t>
+            </a:r>
+          </a:p>
+          <a:p>
+            <a:endParaRPr lang="en-GB" baseline="0" dirty="0" smtClean="0"/>
+          </a:p>
+          <a:p>
+            <a:r>
+              <a:rPr lang="en-GB" baseline="0" dirty="0" smtClean="0"/>
+              <a:t>First recurring stage: </a:t>
+            </a:r>
+            <a:r>
+              <a:rPr lang="en-GB" b="1" baseline="0" dirty="0" smtClean="0"/>
+              <a:t>modular approach </a:t>
+            </a:r>
+            <a:r>
+              <a:rPr lang="en-GB" b="0" baseline="0" dirty="0" smtClean="0"/>
+              <a:t>and difficult enough</a:t>
+            </a:r>
+            <a:endParaRPr lang="en-GB" b="1" dirty="0" smtClean="0"/>
+          </a:p>
+          <a:p>
+            <a:r>
+              <a:rPr lang="en-GB" dirty="0" smtClean="0"/>
+              <a:t>	</a:t>
+            </a:r>
+            <a:endParaRPr lang="en-GB" dirty="0"/>
+          </a:p>
+        </p:txBody>
+      </p:sp>
+      <p:sp>
+        <p:nvSpPr>
+          <p:cNvPr id="4" name="Slide Number Placeholder 3"/>
+          <p:cNvSpPr>
+            <a:spLocks noGrp="1"/>
+          </p:cNvSpPr>
+          <p:nvPr>
+            <p:ph type="sldNum" sz="quarter" idx="10"/>
+          </p:nvPr>
+        </p:nvSpPr>
+        <p:spPr/>
+        <p:txBody>
+          <a:bodyPr/>
+          <a:lstStyle/>
+          <a:p>
+            <a:pPr>
+              <a:defRPr/>
+            </a:pPr>
+            <a:fld id="{5494AABB-68F4-8A45-9BDF-49711EF87E16}" type="slidenum">
+              <a:rPr lang="nl-NL" smtClean="0"/>
+              <a:pPr>
+                <a:defRPr/>
+              </a:pPr>
+              <a:t>1</a:t>
+            </a:fld>
+            <a:endParaRPr lang="nl-NL"/>
+          </a:p>
+        </p:txBody>
+      </p:sp>
+    </p:spTree>
+  </p:cSld>
+  <p:clrMapOvr>
+    <a:masterClrMapping/>
+  </p:clrMapOvr>
+</p:notes>
+</file>
+
+<file path=ppt/notesSlides/notesSlide2.xml><?xml version="1.0" encoding="utf-8"?>
+<p:notes xmlns:a="http://schemas.openxmlformats.org/drawingml/2006/main" xmlns:r="http://schemas.openxmlformats.org/officeDocument/2006/relationships" xmlns:mc="http://schemas.openxmlformats.org/markup-compatibility/2006" xmlns:mv="urn:schemas-microsoft-com:mac:vml" xmlns:p="http://schemas.openxmlformats.org/presentationml/2006/main" mc:Ignorable="mv" mc:PreserveAttributes="mv:*">
+  <p:cSld>
+    <p:spTree>
+      <p:nvGrpSpPr>
+        <p:cNvPr id="1" name=""/>
+        <p:cNvGrpSpPr/>
+        <p:nvPr/>
+      </p:nvGrpSpPr>
+      <p:grpSpPr>
+        <a:xfrm>
+          <a:off x="0" y="0"/>
+          <a:ext cx="0" cy="0"/>
+          <a:chOff x="0" y="0"/>
+          <a:chExt cx="0" cy="0"/>
+        </a:xfrm>
+      </p:grpSpPr>
+      <p:sp>
+        <p:nvSpPr>
+          <p:cNvPr id="2" name="Slide Image Placeholder 1"/>
+          <p:cNvSpPr>
+            <a:spLocks noGrp="1" noRot="1" noChangeAspect="1"/>
+          </p:cNvSpPr>
+          <p:nvPr>
+            <p:ph type="sldImg"/>
+          </p:nvPr>
+        </p:nvSpPr>
+        <p:spPr/>
+      </p:sp>
+      <p:sp>
+        <p:nvSpPr>
+          <p:cNvPr id="3" name="Notes Placeholder 2"/>
+          <p:cNvSpPr>
+            <a:spLocks noGrp="1"/>
+          </p:cNvSpPr>
+          <p:nvPr>
+            <p:ph type="body" idx="1"/>
+          </p:nvPr>
+        </p:nvSpPr>
+        <p:spPr/>
+        <p:txBody>
+          <a:bodyPr>
+            <a:normAutofit/>
+          </a:bodyPr>
+          <a:lstStyle/>
+          <a:p>
+            <a:r>
+              <a:rPr lang="en-GB" dirty="0" smtClean="0"/>
+              <a:t>“Ice skating humanoid robot (2012)”</a:t>
+            </a:r>
+            <a:endParaRPr lang="en-GB" dirty="0"/>
+          </a:p>
+        </p:txBody>
+      </p:sp>
+      <p:sp>
+        <p:nvSpPr>
+          <p:cNvPr id="4" name="Slide Number Placeholder 3"/>
+          <p:cNvSpPr>
+            <a:spLocks noGrp="1"/>
+          </p:cNvSpPr>
+          <p:nvPr>
+            <p:ph type="sldNum" sz="quarter" idx="10"/>
+          </p:nvPr>
+        </p:nvSpPr>
+        <p:spPr/>
+        <p:txBody>
+          <a:bodyPr/>
+          <a:lstStyle/>
+          <a:p>
+            <a:pPr>
+              <a:defRPr/>
+            </a:pPr>
+            <a:fld id="{5494AABB-68F4-8A45-9BDF-49711EF87E16}" type="slidenum">
+              <a:rPr lang="nl-NL" smtClean="0"/>
+              <a:pPr>
+                <a:defRPr/>
+              </a:pPr>
+              <a:t>2</a:t>
+            </a:fld>
+            <a:endParaRPr lang="nl-NL"/>
+          </a:p>
+        </p:txBody>
+      </p:sp>
+    </p:spTree>
+  </p:cSld>
+  <p:clrMapOvr>
+    <a:masterClrMapping/>
+  </p:clrMapOvr>
+</p:notes>
+</file>
+
+<file path=ppt/notesSlides/notesSlide3.xml><?xml version="1.0" encoding="utf-8"?>
+<p:notes xmlns:a="http://schemas.openxmlformats.org/drawingml/2006/main" xmlns:r="http://schemas.openxmlformats.org/officeDocument/2006/relationships" xmlns:mc="http://schemas.openxmlformats.org/markup-compatibility/2006" xmlns:mv="urn:schemas-microsoft-com:mac:vml" xmlns:p="http://schemas.openxmlformats.org/presentationml/2006/main" mc:Ignorable="mv" mc:PreserveAttributes="mv:*">
+  <p:cSld>
+    <p:spTree>
+      <p:nvGrpSpPr>
+        <p:cNvPr id="1" name=""/>
+        <p:cNvGrpSpPr/>
+        <p:nvPr/>
+      </p:nvGrpSpPr>
+      <p:grpSpPr>
+        <a:xfrm>
+          <a:off x="0" y="0"/>
+          <a:ext cx="0" cy="0"/>
+          <a:chOff x="0" y="0"/>
+          <a:chExt cx="0" cy="0"/>
+        </a:xfrm>
+      </p:grpSpPr>
+      <p:sp>
+        <p:nvSpPr>
+          <p:cNvPr id="2" name="Slide Image Placeholder 1"/>
+          <p:cNvSpPr>
+            <a:spLocks noGrp="1" noRot="1" noChangeAspect="1"/>
+          </p:cNvSpPr>
+          <p:nvPr>
+            <p:ph type="sldImg"/>
+          </p:nvPr>
+        </p:nvSpPr>
+        <p:spPr/>
+      </p:sp>
+      <p:sp>
+        <p:nvSpPr>
+          <p:cNvPr id="3" name="Notes Placeholder 2"/>
+          <p:cNvSpPr>
+            <a:spLocks noGrp="1"/>
+          </p:cNvSpPr>
+          <p:nvPr>
+            <p:ph type="body" idx="1"/>
+          </p:nvPr>
+        </p:nvSpPr>
+        <p:spPr/>
+        <p:txBody>
+          <a:bodyPr>
+            <a:normAutofit/>
+          </a:bodyPr>
+          <a:lstStyle/>
+          <a:p>
+            <a:endParaRPr lang="en-GB" b="1" dirty="0" smtClean="0"/>
+          </a:p>
+          <a:p>
+            <a:endParaRPr lang="en-GB" dirty="0" smtClean="0"/>
+          </a:p>
+          <a:p>
+            <a:endParaRPr lang="en-GB" dirty="0"/>
+          </a:p>
+        </p:txBody>
+      </p:sp>
+      <p:sp>
+        <p:nvSpPr>
+          <p:cNvPr id="4" name="Slide Number Placeholder 3"/>
+          <p:cNvSpPr>
+            <a:spLocks noGrp="1"/>
+          </p:cNvSpPr>
+          <p:nvPr>
+            <p:ph type="sldNum" sz="quarter" idx="10"/>
+          </p:nvPr>
+        </p:nvSpPr>
+        <p:spPr/>
+        <p:txBody>
+          <a:bodyPr/>
+          <a:lstStyle/>
+          <a:p>
+            <a:pPr>
+              <a:defRPr/>
+            </a:pPr>
+            <a:fld id="{5494AABB-68F4-8A45-9BDF-49711EF87E16}" type="slidenum">
+              <a:rPr lang="nl-NL" smtClean="0"/>
+              <a:pPr>
+                <a:defRPr/>
+              </a:pPr>
+              <a:t>3</a:t>
+            </a:fld>
+            <a:endParaRPr lang="nl-NL"/>
+          </a:p>
+        </p:txBody>
+      </p:sp>
+    </p:spTree>
+  </p:cSld>
+  <p:clrMapOvr>
+    <a:masterClrMapping/>
+  </p:clrMapOvr>
+</p:notes>
+</file>
+
+<file path=ppt/notesSlides/notesSlide4.xml><?xml version="1.0" encoding="utf-8"?>
+<p:notes xmlns:a="http://schemas.openxmlformats.org/drawingml/2006/main" xmlns:r="http://schemas.openxmlformats.org/officeDocument/2006/relationships" xmlns:mc="http://schemas.openxmlformats.org/markup-compatibility/2006" xmlns:mv="urn:schemas-microsoft-com:mac:vml" xmlns:p="http://schemas.openxmlformats.org/presentationml/2006/main" mc:Ignorable="mv" mc:PreserveAttributes="mv:*">
+  <p:cSld>
+    <p:spTree>
+      <p:nvGrpSpPr>
+        <p:cNvPr id="1" name=""/>
+        <p:cNvGrpSpPr/>
+        <p:nvPr/>
+      </p:nvGrpSpPr>
+      <p:grpSpPr>
+        <a:xfrm>
+          <a:off x="0" y="0"/>
+          <a:ext cx="0" cy="0"/>
+          <a:chOff x="0" y="0"/>
+          <a:chExt cx="0" cy="0"/>
+        </a:xfrm>
+      </p:grpSpPr>
+      <p:sp>
+        <p:nvSpPr>
+          <p:cNvPr id="2" name="Slide Image Placeholder 1"/>
+          <p:cNvSpPr>
+            <a:spLocks noGrp="1" noRot="1" noChangeAspect="1"/>
+          </p:cNvSpPr>
+          <p:nvPr>
+            <p:ph type="sldImg"/>
+          </p:nvPr>
+        </p:nvSpPr>
+        <p:spPr/>
+      </p:sp>
+      <p:sp>
+        <p:nvSpPr>
+          <p:cNvPr id="3" name="Notes Placeholder 2"/>
+          <p:cNvSpPr>
+            <a:spLocks noGrp="1"/>
+          </p:cNvSpPr>
+          <p:nvPr>
+            <p:ph type="body" idx="1"/>
+          </p:nvPr>
+        </p:nvSpPr>
+        <p:spPr/>
+        <p:txBody>
+          <a:bodyPr>
+            <a:normAutofit/>
+          </a:bodyPr>
+          <a:lstStyle/>
+          <a:p>
+            <a:r>
+              <a:rPr lang="en-GB" dirty="0" smtClean="0"/>
+              <a:t>Reality gap: </a:t>
+            </a:r>
+            <a:r>
+              <a:rPr lang="en-GB" b="1" dirty="0" smtClean="0"/>
+              <a:t>probably high, </a:t>
+            </a:r>
+            <a:r>
+              <a:rPr lang="en-GB" b="0" dirty="0" smtClean="0"/>
+              <a:t>because</a:t>
+            </a:r>
+            <a:r>
+              <a:rPr lang="en-GB" b="0" baseline="0" dirty="0" smtClean="0"/>
+              <a:t> of simulator</a:t>
+            </a:r>
+          </a:p>
+          <a:p>
+            <a:r>
+              <a:rPr lang="en-GB" b="0" baseline="0" dirty="0" smtClean="0"/>
+              <a:t>Properties of ice – low surface friction &amp; flat.</a:t>
+            </a:r>
+          </a:p>
+          <a:p>
+            <a:r>
+              <a:rPr lang="en-GB" b="0" baseline="0" dirty="0" smtClean="0"/>
+              <a:t>How does </a:t>
+            </a:r>
+            <a:r>
+              <a:rPr lang="en-GB" b="0" baseline="0" dirty="0" err="1" smtClean="0"/>
+              <a:t>neuro</a:t>
+            </a:r>
+            <a:r>
+              <a:rPr lang="en-GB" b="0" baseline="0" dirty="0" smtClean="0"/>
+              <a:t>-evolution </a:t>
+            </a:r>
+            <a:r>
+              <a:rPr lang="en-GB" b="0" baseline="0" smtClean="0"/>
+              <a:t>work?</a:t>
+            </a:r>
+            <a:endParaRPr lang="en-GB" smtClean="0"/>
+          </a:p>
+          <a:p>
+            <a:endParaRPr lang="en-GB" dirty="0" smtClean="0"/>
+          </a:p>
+          <a:p>
+            <a:r>
+              <a:rPr lang="en-GB" dirty="0" smtClean="0"/>
+              <a:t>Why Gazebo</a:t>
+            </a:r>
+            <a:r>
+              <a:rPr lang="en-GB" baseline="0" dirty="0" smtClean="0"/>
+              <a:t> </a:t>
+            </a:r>
+          </a:p>
+          <a:p>
+            <a:r>
+              <a:rPr lang="en-GB" baseline="0" dirty="0" smtClean="0"/>
+              <a:t>	Previous experience</a:t>
+            </a:r>
+          </a:p>
+          <a:p>
+            <a:r>
+              <a:rPr lang="en-GB" baseline="0" dirty="0" smtClean="0"/>
+              <a:t>	Most used open-source simulators</a:t>
+            </a:r>
+          </a:p>
+          <a:p>
+            <a:endParaRPr lang="en-GB" baseline="0" dirty="0" smtClean="0"/>
+          </a:p>
+          <a:p>
+            <a:endParaRPr lang="en-GB" baseline="0" dirty="0" smtClean="0"/>
+          </a:p>
+        </p:txBody>
+      </p:sp>
+      <p:sp>
+        <p:nvSpPr>
+          <p:cNvPr id="4" name="Slide Number Placeholder 3"/>
+          <p:cNvSpPr>
+            <a:spLocks noGrp="1"/>
+          </p:cNvSpPr>
+          <p:nvPr>
+            <p:ph type="sldNum" sz="quarter" idx="10"/>
+          </p:nvPr>
+        </p:nvSpPr>
+        <p:spPr/>
+        <p:txBody>
+          <a:bodyPr/>
+          <a:lstStyle/>
+          <a:p>
+            <a:pPr>
+              <a:defRPr/>
+            </a:pPr>
+            <a:fld id="{5494AABB-68F4-8A45-9BDF-49711EF87E16}" type="slidenum">
+              <a:rPr lang="nl-NL" smtClean="0"/>
+              <a:pPr>
+                <a:defRPr/>
+              </a:pPr>
+              <a:t>4</a:t>
+            </a:fld>
+            <a:endParaRPr lang="nl-NL"/>
+          </a:p>
+        </p:txBody>
+      </p:sp>
+    </p:spTree>
+  </p:cSld>
+  <p:clrMapOvr>
+    <a:masterClrMapping/>
+  </p:clrMapOvr>
+</p:notes>
+</file>
+
+<file path=ppt/notesSlides/notesSlide5.xml><?xml version="1.0" encoding="utf-8"?>
+<p:notes xmlns:a="http://schemas.openxmlformats.org/drawingml/2006/main" xmlns:r="http://schemas.openxmlformats.org/officeDocument/2006/relationships" xmlns:mc="http://schemas.openxmlformats.org/markup-compatibility/2006" xmlns:mv="urn:schemas-microsoft-com:mac:vml" xmlns:p="http://schemas.openxmlformats.org/presentationml/2006/main" mc:Ignorable="mv" mc:PreserveAttributes="mv:*">
+  <p:cSld>
+    <p:spTree>
+      <p:nvGrpSpPr>
+        <p:cNvPr id="1" name=""/>
+        <p:cNvGrpSpPr/>
+        <p:nvPr/>
+      </p:nvGrpSpPr>
+      <p:grpSpPr>
+        <a:xfrm>
+          <a:off x="0" y="0"/>
+          <a:ext cx="0" cy="0"/>
+          <a:chOff x="0" y="0"/>
+          <a:chExt cx="0" cy="0"/>
+        </a:xfrm>
+      </p:grpSpPr>
+      <p:sp>
+        <p:nvSpPr>
+          <p:cNvPr id="2" name="Slide Image Placeholder 1"/>
+          <p:cNvSpPr>
+            <a:spLocks noGrp="1" noRot="1" noChangeAspect="1"/>
+          </p:cNvSpPr>
+          <p:nvPr>
+            <p:ph type="sldImg"/>
+          </p:nvPr>
+        </p:nvSpPr>
+        <p:spPr/>
+      </p:sp>
+      <p:sp>
+        <p:nvSpPr>
+          <p:cNvPr id="3" name="Notes Placeholder 2"/>
+          <p:cNvSpPr>
+            <a:spLocks noGrp="1"/>
+          </p:cNvSpPr>
+          <p:nvPr>
+            <p:ph type="body" idx="1"/>
+          </p:nvPr>
+        </p:nvSpPr>
+        <p:spPr/>
+        <p:txBody>
+          <a:bodyPr>
+            <a:normAutofit/>
+          </a:bodyPr>
+          <a:lstStyle/>
+          <a:p>
+            <a:endParaRPr lang="en-GB" dirty="0"/>
+          </a:p>
+        </p:txBody>
+      </p:sp>
+      <p:sp>
+        <p:nvSpPr>
+          <p:cNvPr id="4" name="Slide Number Placeholder 3"/>
+          <p:cNvSpPr>
+            <a:spLocks noGrp="1"/>
+          </p:cNvSpPr>
+          <p:nvPr>
+            <p:ph type="sldNum" sz="quarter" idx="10"/>
+          </p:nvPr>
+        </p:nvSpPr>
+        <p:spPr/>
+        <p:txBody>
+          <a:bodyPr/>
+          <a:lstStyle/>
+          <a:p>
+            <a:pPr>
+              <a:defRPr/>
+            </a:pPr>
+            <a:fld id="{5494AABB-68F4-8A45-9BDF-49711EF87E16}" type="slidenum">
+              <a:rPr lang="nl-NL" smtClean="0"/>
+              <a:pPr>
+                <a:defRPr/>
+              </a:pPr>
+              <a:t>6</a:t>
+            </a:fld>
+            <a:endParaRPr lang="nl-NL"/>
+          </a:p>
+        </p:txBody>
+      </p:sp>
+    </p:spTree>
+  </p:cSld>
+  <p:clrMapOvr>
+    <a:masterClrMapping/>
+  </p:clrMapOvr>
+</p:notes>
 </file>
 
 <file path=ppt/slideLayouts/slideLayout1.xml><?xml version="1.0" encoding="utf-8"?>
@@ -6452,7 +7066,7 @@
           <a:blip r:embed="rId2">
             <a:extLst>
               <a:ext uri="{28A0092B-C50C-407E-A947-70E740481C1C}">
-                <a14:useLocalDpi xmlns:mc="http://schemas.openxmlformats.org/markup-compatibility/2006" xmlns:mv="urn:schemas-microsoft-com:mac:vml" xmlns:a14="http://schemas.microsoft.com/office/drawing/2010/main" xmlns:p="http://schemas.openxmlformats.org/presentationml/2006/main" xmlns:r="http://schemas.openxmlformats.org/officeDocument/2006/relationships" xmlns:a="http://schemas.openxmlformats.org/drawingml/2006/main" xmlns="" val="0"/>
+                <a14:useLocalDpi xmlns="" xmlns:a="http://schemas.openxmlformats.org/drawingml/2006/main" xmlns:r="http://schemas.openxmlformats.org/officeDocument/2006/relationships" xmlns:p="http://schemas.openxmlformats.org/presentationml/2006/main" xmlns:a14="http://schemas.microsoft.com/office/drawing/2010/main" xmlns:mv="urn:schemas-microsoft-com:mac:vml" xmlns:mc="http://schemas.openxmlformats.org/markup-compatibility/2006" val="0"/>
               </a:ext>
             </a:extLst>
           </a:blip>
@@ -6472,7 +7086,7 @@
           <a:noFill/>
           <a:extLst>
             <a:ext uri="{909E8E84-426E-40DD-AFC4-6F175D3DCCD1}">
-              <a14:hiddenFill xmlns:mc="http://schemas.openxmlformats.org/markup-compatibility/2006" xmlns:mv="urn:schemas-microsoft-com:mac:vml" xmlns:a14="http://schemas.microsoft.com/office/drawing/2010/main" xmlns:p="http://schemas.openxmlformats.org/presentationml/2006/main" xmlns:r="http://schemas.openxmlformats.org/officeDocument/2006/relationships" xmlns:a="http://schemas.openxmlformats.org/drawingml/2006/main" xmlns="">
+              <a14:hiddenFill xmlns="" xmlns:a="http://schemas.openxmlformats.org/drawingml/2006/main" xmlns:r="http://schemas.openxmlformats.org/officeDocument/2006/relationships" xmlns:p="http://schemas.openxmlformats.org/presentationml/2006/main" xmlns:a14="http://schemas.microsoft.com/office/drawing/2010/main" xmlns:mv="urn:schemas-microsoft-com:mac:vml" xmlns:mc="http://schemas.openxmlformats.org/markup-compatibility/2006">
                 <a:solidFill>
                   <a:srgbClr val="FFFFFF"/>
                 </a:solidFill>
@@ -6593,11 +7207,7 @@
             </a:r>
             <a:r>
               <a:rPr lang="en-GB" i="1" dirty="0" smtClean="0"/>
-              <a:t>.</a:t>
-            </a:r>
-            <a:r>
-              <a:rPr lang="en-GB" i="1" dirty="0" smtClean="0"/>
-              <a:t>”</a:t>
+              <a:t>.”</a:t>
             </a:r>
           </a:p>
           <a:p>
@@ -6693,11 +7303,7 @@
             </a:pPr>
             <a:r>
               <a:rPr lang="en-GB" b="1" dirty="0" smtClean="0"/>
-              <a:t>Recurring stage (i.e. the actual ice skating movement)</a:t>
-            </a:r>
-            <a:r>
-              <a:rPr lang="en-GB" b="1" dirty="0" smtClean="0"/>
-              <a:t>.</a:t>
+              <a:t>Recurring stage (i.e. the actual ice skating movement).</a:t>
             </a:r>
             <a:endParaRPr lang="en-GB" dirty="0" smtClean="0"/>
           </a:p>
@@ -6774,7 +7380,7 @@
       </p:grpSpPr>
       <p:sp>
         <p:nvSpPr>
-          <p:cNvPr id="20482" name="Titel 3"/>
+          <p:cNvPr id="2" name="Title 1"/>
           <p:cNvSpPr>
             <a:spLocks noGrp="1"/>
           </p:cNvSpPr>
@@ -6782,139 +7388,46 @@
             <p:ph type="title"/>
           </p:nvPr>
         </p:nvSpPr>
-        <p:spPr>
-          <a:xfrm>
-            <a:off x="685633" y="930573"/>
-            <a:ext cx="8794719" cy="482203"/>
-          </a:xfrm>
-        </p:spPr>
+        <p:spPr/>
         <p:txBody>
           <a:bodyPr/>
           <a:lstStyle/>
           <a:p>
             <a:r>
-              <a:rPr lang="nl-NL" sz="2800" dirty="0" err="1" smtClean="0">
-                <a:solidFill>
-                  <a:srgbClr val="BE301A"/>
-                </a:solidFill>
-                <a:latin typeface="Arial" pitchFamily="-108" charset="0"/>
-                <a:ea typeface="ＭＳ Ｐゴシック" pitchFamily="-108" charset="-128"/>
-              </a:rPr>
-              <a:t>Implementation</a:t>
-            </a:r>
-            <a:endParaRPr lang="nl-NL" sz="2800" dirty="0">
-              <a:solidFill>
-                <a:srgbClr val="BE301A"/>
-              </a:solidFill>
-              <a:latin typeface="Arial" pitchFamily="-108" charset="0"/>
-              <a:ea typeface="ＭＳ Ｐゴシック" pitchFamily="-108" charset="-128"/>
-            </a:endParaRPr>
+              <a:rPr lang="en-GB" dirty="0" smtClean="0"/>
+              <a:t>State of the art</a:t>
+            </a:r>
+            <a:endParaRPr lang="en-GB" dirty="0"/>
           </a:p>
         </p:txBody>
       </p:sp>
-      <p:sp>
-        <p:nvSpPr>
-          <p:cNvPr id="5" name="Tijdelijke aanduiding voor inhoud 4"/>
-          <p:cNvSpPr>
-            <a:spLocks noGrp="1"/>
-          </p:cNvSpPr>
+      <p:pic>
+        <p:nvPicPr>
+          <p:cNvPr id="5" name="darwin_skating.mp4">
+            <a:hlinkClick r:id="" action="ppaction://media"/>
+          </p:cNvPr>
+          <p:cNvPicPr/>
           <p:nvPr>
             <p:ph idx="1"/>
+            <a:videoFile r:link="rId1"/>
           </p:nvPr>
-        </p:nvSpPr>
+        </p:nvPicPr>
+        <p:blipFill>
+          <a:blip r:embed="rId4"/>
+          <a:stretch>
+            <a:fillRect/>
+          </a:stretch>
+        </p:blipFill>
         <p:spPr>
           <a:xfrm>
-            <a:off x="685633" y="1723454"/>
-            <a:ext cx="8794719" cy="3937794"/>
+            <a:off x="1044575" y="1009650"/>
+            <a:ext cx="8077200" cy="4572000"/>
           </a:xfrm>
         </p:spPr>
-        <p:txBody>
-          <a:bodyPr/>
-          <a:lstStyle/>
-          <a:p>
-            <a:pPr eaLnBrk="1" hangingPunct="1">
-              <a:lnSpc>
-                <a:spcPct val="100000"/>
-              </a:lnSpc>
-              <a:spcAft>
-                <a:spcPts val="1042"/>
-              </a:spcAft>
-            </a:pPr>
-            <a:r>
-              <a:rPr lang="en-GB" dirty="0" smtClean="0"/>
-              <a:t>Simulator with a physics engine;</a:t>
-            </a:r>
-          </a:p>
-          <a:p>
-            <a:pPr eaLnBrk="1" hangingPunct="1">
-              <a:lnSpc>
-                <a:spcPct val="100000"/>
-              </a:lnSpc>
-              <a:spcAft>
-                <a:spcPts val="1042"/>
-              </a:spcAft>
-            </a:pPr>
-            <a:r>
-              <a:rPr lang="en-GB" dirty="0" smtClean="0"/>
-              <a:t>Initial speed (since focus on recurring stage);</a:t>
-            </a:r>
-          </a:p>
-          <a:p>
-            <a:pPr eaLnBrk="1" hangingPunct="1">
-              <a:lnSpc>
-                <a:spcPct val="100000"/>
-              </a:lnSpc>
-              <a:spcAft>
-                <a:spcPts val="1042"/>
-              </a:spcAft>
-            </a:pPr>
-            <a:r>
-              <a:rPr lang="en-GB" dirty="0" err="1" smtClean="0"/>
-              <a:t>Neuroevolution</a:t>
-            </a:r>
-            <a:r>
-              <a:rPr lang="en-GB" dirty="0" smtClean="0"/>
-              <a:t>:</a:t>
-            </a:r>
-          </a:p>
-          <a:p>
-            <a:pPr lvl="3" eaLnBrk="1" hangingPunct="1">
-              <a:lnSpc>
-                <a:spcPct val="100000"/>
-              </a:lnSpc>
-              <a:spcAft>
-                <a:spcPts val="1042"/>
-              </a:spcAft>
-            </a:pPr>
-            <a:r>
-              <a:rPr lang="en-GB" dirty="0" smtClean="0"/>
-              <a:t>With </a:t>
-            </a:r>
-            <a:r>
-              <a:rPr lang="en-GB" dirty="0" err="1" smtClean="0"/>
-              <a:t>HyperNEAT</a:t>
-            </a:r>
-            <a:r>
-              <a:rPr lang="en-GB" dirty="0" smtClean="0"/>
-              <a:t> using indirect encoding.</a:t>
-            </a:r>
-          </a:p>
-          <a:p>
-            <a:pPr eaLnBrk="1" hangingPunct="1">
-              <a:lnSpc>
-                <a:spcPct val="100000"/>
-              </a:lnSpc>
-              <a:spcAft>
-                <a:spcPts val="1042"/>
-              </a:spcAft>
-            </a:pPr>
-            <a:endParaRPr lang="en-GB" dirty="0" smtClean="0"/>
-          </a:p>
-        </p:txBody>
-      </p:sp>
-      <p:sp>
-        <p:nvSpPr>
-          <p:cNvPr id="6" name="Slide Number Placeholder 5"/>
+      </p:pic>
+      <p:sp>
+        <p:nvSpPr>
+          <p:cNvPr id="4" name="Slide Number Placeholder 3"/>
           <p:cNvSpPr>
             <a:spLocks noGrp="1"/>
           </p:cNvSpPr>
@@ -6937,11 +7450,6 @@
         </p:txBody>
       </p:sp>
     </p:spTree>
-    <p:extLst>
-      <p:ext uri="{BB962C8B-B14F-4D97-AF65-F5344CB8AC3E}">
-        <p14:creationId xmlns:mc="http://schemas.openxmlformats.org/markup-compatibility/2006" xmlns:mv="urn:schemas-microsoft-com:mac:vml" xmlns:p14="http://schemas.microsoft.com/office/powerpoint/2010/main" xmlns:p="http://schemas.openxmlformats.org/presentationml/2006/main" xmlns:r="http://schemas.openxmlformats.org/officeDocument/2006/relationships" xmlns:a="http://schemas.openxmlformats.org/drawingml/2006/main" xmlns="" val="75972892"/>
-      </p:ext>
-    </p:extLst>
   </p:cSld>
   <p:clrMapOvr>
     <a:masterClrMapping/>
@@ -6950,7 +7458,92 @@
   <p:timing>
     <p:tnLst>
       <p:par>
-        <p:cTn id="1" dur="indefinite" restart="never" nodeType="tmRoot"/>
+        <p:cTn id="1" dur="indefinite" restart="never" nodeType="tmRoot">
+          <p:childTnLst>
+            <p:seq concurrent="1" nextAc="seek">
+              <p:cTn id="2" restart="whenNotActive" fill="hold" evtFilter="cancelBubble" nodeType="interactiveSeq">
+                <p:stCondLst>
+                  <p:cond evt="onClick" delay="0">
+                    <p:tgtEl>
+                      <p:spTgt spid="5"/>
+                    </p:tgtEl>
+                  </p:cond>
+                </p:stCondLst>
+                <p:endSync evt="end" delay="0">
+                  <p:rtn val="all"/>
+                </p:endSync>
+                <p:childTnLst>
+                  <p:par>
+                    <p:cTn id="3" fill="hold">
+                      <p:stCondLst>
+                        <p:cond delay="0"/>
+                      </p:stCondLst>
+                      <p:childTnLst>
+                        <p:par>
+                          <p:cTn id="4" fill="hold">
+                            <p:stCondLst>
+                              <p:cond delay="0"/>
+                            </p:stCondLst>
+                            <p:childTnLst>
+                              <p:par>
+                                <p:cTn id="5" presetID="2" presetClass="mediacall" presetSubtype="0" fill="hold" nodeType="clickEffect">
+                                  <p:stCondLst>
+                                    <p:cond delay="0"/>
+                                  </p:stCondLst>
+                                  <p:childTnLst>
+                                    <p:cmd type="call" cmd="togglePause">
+                                      <p:cBhvr>
+                                        <p:cTn id="6" dur="1" fill="hold"/>
+                                        <p:tgtEl>
+                                          <p:spTgt spid="5"/>
+                                        </p:tgtEl>
+                                      </p:cBhvr>
+                                    </p:cmd>
+                                  </p:childTnLst>
+                                </p:cTn>
+                              </p:par>
+                            </p:childTnLst>
+                          </p:cTn>
+                        </p:par>
+                      </p:childTnLst>
+                    </p:cTn>
+                  </p:par>
+                </p:childTnLst>
+              </p:cTn>
+              <p:nextCondLst>
+                <p:cond evt="onClick" delay="0">
+                  <p:tgtEl>
+                    <p:spTgt spid="5"/>
+                  </p:tgtEl>
+                </p:cond>
+              </p:nextCondLst>
+            </p:seq>
+            <p:video>
+              <p:cMediaNode>
+                <p:cTn id="7" fill="hold" display="0">
+                  <p:stCondLst>
+                    <p:cond delay="indefinite"/>
+                  </p:stCondLst>
+                  <p:endCondLst>
+                    <p:cond evt="onNext" delay="0">
+                      <p:tgtEl>
+                        <p:sldTgt/>
+                      </p:tgtEl>
+                    </p:cond>
+                    <p:cond evt="onPrev" delay="0">
+                      <p:tgtEl>
+                        <p:sldTgt/>
+                      </p:tgtEl>
+                    </p:cond>
+                  </p:endCondLst>
+                </p:cTn>
+                <p:tgtEl>
+                  <p:spTgt spid="5"/>
+                </p:tgtEl>
+              </p:cMediaNode>
+            </p:video>
+          </p:childTnLst>
+        </p:cTn>
       </p:par>
     </p:tnLst>
   </p:timing>
@@ -6958,7 +7551,7 @@
 </file>
 
 <file path=ppt/slides/slide4.xml><?xml version="1.0" encoding="utf-8"?>
-<p:sld xmlns:a="http://schemas.openxmlformats.org/drawingml/2006/main" xmlns:r="http://schemas.openxmlformats.org/officeDocument/2006/relationships" xmlns:mc="http://schemas.openxmlformats.org/markup-compatibility/2006" xmlns:mv="urn:schemas-microsoft-com:mac:vml" xmlns:p="http://schemas.openxmlformats.org/presentationml/2006/main" mc:Ignorable="mv" mc:PreserveAttributes="mv:*">
+<p:sld xmlns:a="http://schemas.openxmlformats.org/drawingml/2006/main" xmlns:r="http://schemas.openxmlformats.org/officeDocument/2006/relationships" xmlns:mc="http://schemas.openxmlformats.org/markup-compatibility/2006" xmlns:mv="urn:schemas-microsoft-com:mac:vml" xmlns:p="http://schemas.openxmlformats.org/presentationml/2006/main" mc:Ignorable="mv" mc:PreserveAttributes="mv:*" show="0">
   <p:cSld>
     <p:spTree>
       <p:nvGrpSpPr>
@@ -6995,14 +7588,14 @@
           <a:lstStyle/>
           <a:p>
             <a:r>
-              <a:rPr lang="nl-NL" sz="2800" dirty="0" smtClean="0">
+              <a:rPr lang="nl-NL" sz="2800" dirty="0" err="1" smtClean="0">
                 <a:solidFill>
                   <a:srgbClr val="BE301A"/>
                 </a:solidFill>
                 <a:latin typeface="Arial" pitchFamily="-108" charset="0"/>
                 <a:ea typeface="ＭＳ Ｐゴシック" pitchFamily="-108" charset="-128"/>
               </a:rPr>
-              <a:t>Simulator</a:t>
+              <a:t>Implementation</a:t>
             </a:r>
             <a:endParaRPr lang="nl-NL" sz="2800" dirty="0">
               <a:solidFill>
@@ -7044,7 +7637,43 @@
             </a:pPr>
             <a:r>
               <a:rPr lang="en-GB" dirty="0" smtClean="0"/>
-              <a:t>Gazebo:</a:t>
+              <a:t>Simulator with a physics engine;</a:t>
+            </a:r>
+          </a:p>
+          <a:p>
+            <a:pPr eaLnBrk="1" hangingPunct="1">
+              <a:lnSpc>
+                <a:spcPct val="100000"/>
+              </a:lnSpc>
+              <a:spcAft>
+                <a:spcPts val="1042"/>
+              </a:spcAft>
+            </a:pPr>
+            <a:r>
+              <a:rPr lang="en-GB" dirty="0" smtClean="0"/>
+              <a:t>Initial speed (since focus on recurring stage);</a:t>
+            </a:r>
+          </a:p>
+          <a:p>
+            <a:pPr eaLnBrk="1" hangingPunct="1">
+              <a:lnSpc>
+                <a:spcPct val="100000"/>
+              </a:lnSpc>
+              <a:spcAft>
+                <a:spcPts val="1042"/>
+              </a:spcAft>
+            </a:pPr>
+            <a:r>
+              <a:rPr lang="en-GB" dirty="0" err="1" smtClean="0"/>
+              <a:t>Neuro</a:t>
+            </a:r>
+            <a:r>
+              <a:rPr lang="en-GB" dirty="0" smtClean="0"/>
+              <a:t>-evolution</a:t>
+            </a:r>
+            <a:r>
+              <a:rPr lang="en-GB" dirty="0" smtClean="0"/>
+              <a:t>:</a:t>
             </a:r>
           </a:p>
           <a:p>
@@ -7058,21 +7687,15 @@
             </a:pPr>
             <a:r>
               <a:rPr lang="en-GB" dirty="0" smtClean="0"/>
-              <a:t>Simulating the environment (match surfaces slipperiness with that of ice);</a:t>
-            </a:r>
-          </a:p>
-          <a:p>
-            <a:pPr lvl="3" eaLnBrk="1" hangingPunct="1">
-              <a:lnSpc>
-                <a:spcPct val="100000"/>
-              </a:lnSpc>
-              <a:spcAft>
-                <a:spcPts val="1042"/>
-              </a:spcAft>
-            </a:pPr>
+              <a:t>With </a:t>
+            </a:r>
+            <a:r>
+              <a:rPr lang="en-GB" dirty="0" err="1" smtClean="0"/>
+              <a:t>HyperNEAT</a:t>
+            </a:r>
             <a:r>
               <a:rPr lang="en-GB" dirty="0" smtClean="0"/>
-              <a:t>Simulating the robot (i.e. a stick model of the robot).</a:t>
+              <a:t> using indirect encoding.</a:t>
             </a:r>
           </a:p>
           <a:p>
@@ -7084,38 +7707,7 @@
                 <a:spcPts val="1042"/>
               </a:spcAft>
             </a:pPr>
-            <a:r>
-              <a:rPr lang="en-GB" dirty="0" smtClean="0"/>
-              <a:t>Should be easy to:</a:t>
-            </a:r>
-          </a:p>
-          <a:p>
-            <a:pPr lvl="3" eaLnBrk="1" hangingPunct="1">
-              <a:lnSpc>
-                <a:spcPct val="100000"/>
-              </a:lnSpc>
-              <a:spcAft>
-                <a:spcPts val="1042"/>
-              </a:spcAft>
-            </a:pPr>
-            <a:r>
-              <a:rPr lang="en-GB" dirty="0" smtClean="0"/>
-              <a:t>Run multiple trials;</a:t>
-            </a:r>
-          </a:p>
-          <a:p>
-            <a:pPr lvl="3" eaLnBrk="1" hangingPunct="1">
-              <a:lnSpc>
-                <a:spcPct val="100000"/>
-              </a:lnSpc>
-              <a:spcAft>
-                <a:spcPts val="1042"/>
-              </a:spcAft>
-            </a:pPr>
-            <a:r>
-              <a:rPr lang="en-GB" dirty="0" smtClean="0"/>
-              <a:t>Retrieve data from the simulator (i.e. position of the robot).</a:t>
-            </a:r>
+            <a:endParaRPr lang="en-GB" dirty="0" smtClean="0"/>
           </a:p>
         </p:txBody>
       </p:sp>
@@ -7146,7 +7738,7 @@
     </p:spTree>
     <p:extLst>
       <p:ext uri="{BB962C8B-B14F-4D97-AF65-F5344CB8AC3E}">
-        <p14:creationId xmlns:mc="http://schemas.openxmlformats.org/markup-compatibility/2006" xmlns:mv="urn:schemas-microsoft-com:mac:vml" xmlns:p14="http://schemas.microsoft.com/office/powerpoint/2010/main" xmlns:p="http://schemas.openxmlformats.org/presentationml/2006/main" xmlns:r="http://schemas.openxmlformats.org/officeDocument/2006/relationships" xmlns:a="http://schemas.openxmlformats.org/drawingml/2006/main" xmlns="" val="75972892"/>
+        <p14:creationId xmlns="" xmlns:a="http://schemas.openxmlformats.org/drawingml/2006/main" xmlns:r="http://schemas.openxmlformats.org/officeDocument/2006/relationships" xmlns:p="http://schemas.openxmlformats.org/presentationml/2006/main" xmlns:p14="http://schemas.microsoft.com/office/powerpoint/2010/main" xmlns:mv="urn:schemas-microsoft-com:mac:vml" xmlns:mc="http://schemas.openxmlformats.org/markup-compatibility/2006" val="75972892"/>
       </p:ext>
     </p:extLst>
   </p:cSld>
@@ -7202,14 +7794,14 @@
           <a:lstStyle/>
           <a:p>
             <a:r>
-              <a:rPr lang="nl-NL" sz="2800" dirty="0" err="1" smtClean="0">
+              <a:rPr lang="nl-NL" sz="2800" dirty="0" smtClean="0">
                 <a:solidFill>
                   <a:srgbClr val="BE301A"/>
                 </a:solidFill>
                 <a:latin typeface="Arial" pitchFamily="-108" charset="0"/>
                 <a:ea typeface="ＭＳ Ｐゴシック" pitchFamily="-108" charset="-128"/>
               </a:rPr>
-              <a:t>HyperNEAT</a:t>
+              <a:t>Simulator</a:t>
             </a:r>
             <a:endParaRPr lang="nl-NL" sz="2800" dirty="0">
               <a:solidFill>
@@ -7251,7 +7843,7 @@
             </a:pPr>
             <a:r>
               <a:rPr lang="en-GB" dirty="0" smtClean="0"/>
-              <a:t>NEAT:</a:t>
+              <a:t>Gazebo:</a:t>
             </a:r>
           </a:p>
           <a:p>
@@ -7265,7 +7857,15 @@
             </a:pPr>
             <a:r>
               <a:rPr lang="en-GB" dirty="0" smtClean="0"/>
-              <a:t>Increase complexity over time (keep track of genes);</a:t>
+              <a:t>Simulating the environment (match </a:t>
+            </a:r>
+            <a:r>
+              <a:rPr lang="en-GB" dirty="0" smtClean="0"/>
+              <a:t>surface friction with </a:t>
+            </a:r>
+            <a:r>
+              <a:rPr lang="en-GB" dirty="0" smtClean="0"/>
+              <a:t>that of ice);</a:t>
             </a:r>
           </a:p>
           <a:p>
@@ -7278,12 +7878,12 @@
               </a:spcAft>
             </a:pPr>
             <a:r>
-              <a:rPr lang="en-GB" dirty="0" err="1" smtClean="0"/>
-              <a:t>Speciating</a:t>
-            </a:r>
-            <a:r>
               <a:rPr lang="en-GB" dirty="0" smtClean="0"/>
-              <a:t> the population (compete in niches at first);</a:t>
+              <a:t>Simulating the robot (i.e. a stick model of the robot)</a:t>
+            </a:r>
+            <a:r>
+              <a:rPr lang="en-GB" dirty="0" smtClean="0"/>
+              <a:t>.</a:t>
             </a:r>
           </a:p>
           <a:p>
@@ -7297,8 +7897,21 @@
             </a:pPr>
             <a:r>
               <a:rPr lang="en-GB" dirty="0" smtClean="0"/>
-              <a:t>Initially uniform population.</a:t>
-            </a:r>
+              <a:t>Add </a:t>
+            </a:r>
+            <a:r>
+              <a:rPr lang="en-GB" dirty="0" err="1" smtClean="0"/>
+              <a:t>neuro</a:t>
+            </a:r>
+            <a:r>
+              <a:rPr lang="en-GB" dirty="0" smtClean="0"/>
+              <a:t>-evolution </a:t>
+            </a:r>
+            <a:r>
+              <a:rPr lang="en-GB" smtClean="0"/>
+              <a:t>algorithm feedback</a:t>
+            </a:r>
+            <a:endParaRPr lang="en-GB" smtClean="0"/>
           </a:p>
           <a:p>
             <a:pPr eaLnBrk="1" hangingPunct="1">
@@ -7310,12 +7923,8 @@
               </a:spcAft>
             </a:pPr>
             <a:r>
-              <a:rPr lang="en-GB" dirty="0" err="1" smtClean="0"/>
-              <a:t>HyperNEAT</a:t>
-            </a:r>
-            <a:r>
               <a:rPr lang="en-GB" dirty="0" smtClean="0"/>
-              <a:t> (extension of NEAT):</a:t>
+              <a:t>Should be easy to:</a:t>
             </a:r>
           </a:p>
           <a:p>
@@ -7329,7 +7938,7 @@
             </a:pPr>
             <a:r>
               <a:rPr lang="en-GB" dirty="0" smtClean="0"/>
-              <a:t>Learn regularities (i.e. similarity or repeating patterns);</a:t>
+              <a:t>Run multiple trials;</a:t>
             </a:r>
           </a:p>
           <a:p>
@@ -7343,19 +7952,8 @@
             </a:pPr>
             <a:r>
               <a:rPr lang="en-GB" dirty="0" smtClean="0"/>
-              <a:t>Input and output placement.</a:t>
-            </a:r>
-          </a:p>
-          <a:p>
-            <a:pPr lvl="4" eaLnBrk="1" hangingPunct="1">
-              <a:lnSpc>
-                <a:spcPct val="100000"/>
-              </a:lnSpc>
-              <a:spcAft>
-                <a:spcPts val="1042"/>
-              </a:spcAft>
-            </a:pPr>
-            <a:endParaRPr lang="en-GB" dirty="0" smtClean="0"/>
+              <a:t>Retrieve data from the simulator (i.e. position of the robot).</a:t>
+            </a:r>
           </a:p>
         </p:txBody>
       </p:sp>
@@ -7386,7 +7984,7 @@
     </p:spTree>
     <p:extLst>
       <p:ext uri="{BB962C8B-B14F-4D97-AF65-F5344CB8AC3E}">
-        <p14:creationId xmlns:mc="http://schemas.openxmlformats.org/markup-compatibility/2006" xmlns:mv="urn:schemas-microsoft-com:mac:vml" xmlns:p14="http://schemas.microsoft.com/office/powerpoint/2010/main" xmlns:p="http://schemas.openxmlformats.org/presentationml/2006/main" xmlns:r="http://schemas.openxmlformats.org/officeDocument/2006/relationships" xmlns:a="http://schemas.openxmlformats.org/drawingml/2006/main" xmlns="" val="75972892"/>
+        <p14:creationId xmlns="" xmlns:a="http://schemas.openxmlformats.org/drawingml/2006/main" xmlns:r="http://schemas.openxmlformats.org/officeDocument/2006/relationships" xmlns:p="http://schemas.openxmlformats.org/presentationml/2006/main" xmlns:p14="http://schemas.microsoft.com/office/powerpoint/2010/main" xmlns:mv="urn:schemas-microsoft-com:mac:vml" xmlns:mc="http://schemas.openxmlformats.org/markup-compatibility/2006" val="75972892"/>
       </p:ext>
     </p:extLst>
   </p:cSld>
@@ -7491,7 +8089,7 @@
             </a:pPr>
             <a:r>
               <a:rPr lang="en-GB" dirty="0" smtClean="0"/>
-              <a:t>Mapping:</a:t>
+              <a:t>NEAT:</a:t>
             </a:r>
           </a:p>
           <a:p>
@@ -7505,7 +8103,7 @@
             </a:pPr>
             <a:r>
               <a:rPr lang="en-GB" dirty="0" smtClean="0"/>
-              <a:t>Initially only leg joints jaw and pitch (possibly extending with other joints, i.e. arms);</a:t>
+              <a:t>Increase complexity over time (keep track of genes);</a:t>
             </a:r>
           </a:p>
           <a:p>
@@ -7518,8 +8116,26 @@
               </a:spcAft>
             </a:pPr>
             <a:r>
+              <a:rPr lang="en-GB" dirty="0" err="1" smtClean="0"/>
+              <a:t>Speciating</a:t>
+            </a:r>
+            <a:r>
               <a:rPr lang="en-GB" dirty="0" smtClean="0"/>
-              <a:t>Time steps of 100 ms.</a:t>
+              <a:t> the population (compete in niches at first);</a:t>
+            </a:r>
+          </a:p>
+          <a:p>
+            <a:pPr lvl="3" eaLnBrk="1" hangingPunct="1">
+              <a:lnSpc>
+                <a:spcPct val="100000"/>
+              </a:lnSpc>
+              <a:spcAft>
+                <a:spcPts val="1042"/>
+              </a:spcAft>
+            </a:pPr>
+            <a:r>
+              <a:rPr lang="en-GB" dirty="0" smtClean="0"/>
+              <a:t>Initially uniform population.</a:t>
             </a:r>
           </a:p>
           <a:p>
@@ -7532,58 +8148,12 @@
               </a:spcAft>
             </a:pPr>
             <a:r>
+              <a:rPr lang="en-GB" dirty="0" err="1" smtClean="0"/>
+              <a:t>HyperNEAT</a:t>
+            </a:r>
+            <a:r>
               <a:rPr lang="en-GB" dirty="0" smtClean="0"/>
-              <a:t>Fitness:</a:t>
-            </a:r>
-          </a:p>
-          <a:p>
-            <a:pPr lvl="1" eaLnBrk="1" hangingPunct="1">
-              <a:lnSpc>
-                <a:spcPct val="100000"/>
-              </a:lnSpc>
-              <a:spcAft>
-                <a:spcPts val="1042"/>
-              </a:spcAft>
-            </a:pPr>
-            <a:r>
-              <a:rPr lang="en-GB" dirty="0" err="1" smtClean="0"/>
-              <a:t>Maximalization</a:t>
-            </a:r>
-            <a:r>
-              <a:rPr lang="en-GB" smtClean="0"/>
-              <a:t> within N </a:t>
-            </a:r>
-            <a:r>
-              <a:rPr lang="en-GB" dirty="0" smtClean="0"/>
-              <a:t>seconds;</a:t>
-            </a:r>
-          </a:p>
-          <a:p>
-            <a:pPr lvl="1" eaLnBrk="1" hangingPunct="1">
-              <a:lnSpc>
-                <a:spcPct val="100000"/>
-              </a:lnSpc>
-              <a:spcAft>
-                <a:spcPts val="1042"/>
-              </a:spcAft>
-            </a:pPr>
-            <a:r>
-              <a:rPr lang="en-GB" dirty="0" smtClean="0"/>
-              <a:t>Falling over means minimal fitness;</a:t>
-            </a:r>
-          </a:p>
-          <a:p>
-            <a:pPr lvl="1" eaLnBrk="1" hangingPunct="1">
-              <a:lnSpc>
-                <a:spcPct val="100000"/>
-              </a:lnSpc>
-              <a:spcAft>
-                <a:spcPts val="1042"/>
-              </a:spcAft>
-            </a:pPr>
-            <a:r>
-              <a:rPr lang="en-GB" dirty="0" smtClean="0"/>
-              <a:t>Properties:</a:t>
+              <a:t> (extension of NEAT):</a:t>
             </a:r>
           </a:p>
           <a:p>
@@ -7597,7 +8167,7 @@
             </a:pPr>
             <a:r>
               <a:rPr lang="en-GB" dirty="0" smtClean="0"/>
-              <a:t>Distance;</a:t>
+              <a:t>Learn regularities (i.e. similarity or repeating patterns);</a:t>
             </a:r>
           </a:p>
           <a:p>
@@ -7611,11 +8181,11 @@
             </a:pPr>
             <a:r>
               <a:rPr lang="en-GB" dirty="0" smtClean="0"/>
-              <a:t>Speed.</a:t>
-            </a:r>
-          </a:p>
-          <a:p>
-            <a:pPr lvl="3" eaLnBrk="1" hangingPunct="1">
+              <a:t>Input and output placement.</a:t>
+            </a:r>
+          </a:p>
+          <a:p>
+            <a:pPr lvl="4" eaLnBrk="1" hangingPunct="1">
               <a:lnSpc>
                 <a:spcPct val="100000"/>
               </a:lnSpc>
@@ -7625,18 +8195,6 @@
             </a:pPr>
             <a:endParaRPr lang="en-GB" dirty="0" smtClean="0"/>
           </a:p>
-          <a:p>
-            <a:pPr lvl="3" eaLnBrk="1" hangingPunct="1">
-              <a:lnSpc>
-                <a:spcPct val="100000"/>
-              </a:lnSpc>
-              <a:spcAft>
-                <a:spcPts val="1042"/>
-              </a:spcAft>
-              <a:buNone/>
-            </a:pPr>
-            <a:endParaRPr lang="en-GB" dirty="0" smtClean="0"/>
-          </a:p>
         </p:txBody>
       </p:sp>
       <p:sp>
@@ -7666,7 +8224,7 @@
     </p:spTree>
     <p:extLst>
       <p:ext uri="{BB962C8B-B14F-4D97-AF65-F5344CB8AC3E}">
-        <p14:creationId xmlns:mc="http://schemas.openxmlformats.org/markup-compatibility/2006" xmlns:mv="urn:schemas-microsoft-com:mac:vml" xmlns:p14="http://schemas.microsoft.com/office/powerpoint/2010/main" xmlns:p="http://schemas.openxmlformats.org/presentationml/2006/main" xmlns:r="http://schemas.openxmlformats.org/officeDocument/2006/relationships" xmlns:a="http://schemas.openxmlformats.org/drawingml/2006/main" xmlns="" val="75972892"/>
+        <p14:creationId xmlns="" xmlns:a="http://schemas.openxmlformats.org/drawingml/2006/main" xmlns:r="http://schemas.openxmlformats.org/officeDocument/2006/relationships" xmlns:p="http://schemas.openxmlformats.org/presentationml/2006/main" xmlns:p14="http://schemas.microsoft.com/office/powerpoint/2010/main" xmlns:mv="urn:schemas-microsoft-com:mac:vml" xmlns:mc="http://schemas.openxmlformats.org/markup-compatibility/2006" val="75972892"/>
       </p:ext>
     </p:extLst>
   </p:cSld>
@@ -7729,27 +8287,7 @@
                 <a:latin typeface="Arial" pitchFamily="-108" charset="0"/>
                 <a:ea typeface="ＭＳ Ｐゴシック" pitchFamily="-108" charset="-128"/>
               </a:rPr>
-              <a:t>Previous</a:t>
-            </a:r>
-            <a:r>
-              <a:rPr lang="nl-NL" sz="2800" dirty="0" smtClean="0">
-                <a:solidFill>
-                  <a:srgbClr val="BE301A"/>
-                </a:solidFill>
-                <a:latin typeface="Arial" pitchFamily="-108" charset="0"/>
-                <a:ea typeface="ＭＳ Ｐゴシック" pitchFamily="-108" charset="-128"/>
-              </a:rPr>
-              <a:t> </a:t>
-            </a:r>
-            <a:r>
-              <a:rPr lang="nl-NL" sz="2800" dirty="0" err="1" smtClean="0">
-                <a:solidFill>
-                  <a:srgbClr val="BE301A"/>
-                </a:solidFill>
-                <a:latin typeface="Arial" pitchFamily="-108" charset="0"/>
-                <a:ea typeface="ＭＳ Ｐゴシック" pitchFamily="-108" charset="-128"/>
-              </a:rPr>
-              <a:t>work</a:t>
+              <a:t>HyperNEAT</a:t>
             </a:r>
             <a:endParaRPr lang="nl-NL" sz="2800" dirty="0">
               <a:solidFill>
@@ -7790,49 +8328,41 @@
               </a:spcAft>
             </a:pPr>
             <a:r>
-              <a:rPr lang="en-GB" dirty="0"/>
-              <a:t>Ice Skating Humanoid </a:t>
-            </a:r>
-            <a:r>
               <a:rPr lang="en-GB" dirty="0" smtClean="0"/>
-              <a:t>Robot </a:t>
-            </a:r>
-          </a:p>
-          <a:p>
-            <a:pPr marL="0" indent="0" eaLnBrk="1" hangingPunct="1">
+              <a:t>Mapping:</a:t>
+            </a:r>
+          </a:p>
+          <a:p>
+            <a:pPr lvl="3" eaLnBrk="1" hangingPunct="1">
               <a:lnSpc>
                 <a:spcPct val="100000"/>
               </a:lnSpc>
               <a:spcAft>
                 <a:spcPts val="1042"/>
               </a:spcAft>
-              <a:buNone/>
             </a:pPr>
             <a:r>
-              <a:rPr lang="en-GB" sz="1200" dirty="0"/>
-              <a:t>	</a:t>
-            </a:r>
-            <a:r>
-              <a:rPr lang="en-US" sz="1200" dirty="0" smtClean="0"/>
-              <a:t>Chris </a:t>
-            </a:r>
-            <a:r>
-              <a:rPr lang="en-US" sz="1200" dirty="0" err="1"/>
-              <a:t>Iverach</a:t>
-            </a:r>
-            <a:r>
-              <a:rPr lang="en-US" sz="1200" dirty="0"/>
-              <a:t>-Brereton, Andrew Winton and Jacky </a:t>
-            </a:r>
-            <a:r>
-              <a:rPr lang="en-US" sz="1200" dirty="0" err="1" smtClean="0"/>
-              <a:t>Baltes</a:t>
-            </a:r>
-            <a:r>
-              <a:rPr lang="en-US" sz="1200" dirty="0" smtClean="0"/>
-              <a:t> (2012)</a:t>
-            </a:r>
-            <a:endParaRPr lang="en-GB" sz="1200" dirty="0" smtClean="0"/>
+              <a:rPr lang="en-GB" dirty="0" smtClean="0"/>
+              <a:t>Initially only leg joints jaw and pitch (possibly extending with other joints, i.e. arms)</a:t>
+            </a:r>
+            <a:r>
+              <a:rPr lang="en-GB" dirty="0" smtClean="0"/>
+              <a:t>;</a:t>
+            </a:r>
+          </a:p>
+          <a:p>
+            <a:pPr lvl="3" eaLnBrk="1" hangingPunct="1">
+              <a:lnSpc>
+                <a:spcPct val="100000"/>
+              </a:lnSpc>
+              <a:spcAft>
+                <a:spcPts val="1042"/>
+              </a:spcAft>
+            </a:pPr>
+            <a:r>
+              <a:rPr lang="en-GB" dirty="0" smtClean="0"/>
+              <a:t>Discrete time steps for feedback (e.g. 100 ms).</a:t>
+            </a:r>
           </a:p>
           <a:p>
             <a:pPr eaLnBrk="1" hangingPunct="1">
@@ -7844,104 +8374,16 @@
               </a:spcAft>
             </a:pPr>
             <a:r>
-              <a:rPr lang="en-US" dirty="0" smtClean="0"/>
-              <a:t>Evolving Robot Gaits in Hardware: the </a:t>
-            </a:r>
-            <a:r>
-              <a:rPr lang="en-US" dirty="0" err="1" smtClean="0"/>
-              <a:t>HyperNEAT</a:t>
-            </a:r>
-            <a:r>
-              <a:rPr lang="en-US" dirty="0" smtClean="0"/>
-              <a:t> Generative Encoding Vs. Parameter Optimization</a:t>
-            </a:r>
-          </a:p>
-          <a:p>
-            <a:pPr marL="0" indent="0" eaLnBrk="1" hangingPunct="1">
-              <a:lnSpc>
-                <a:spcPct val="100000"/>
-              </a:lnSpc>
-              <a:spcAft>
-                <a:spcPts val="1042"/>
-              </a:spcAft>
-              <a:buNone/>
-            </a:pPr>
-            <a:r>
-              <a:rPr lang="en-US" dirty="0" smtClean="0"/>
-              <a:t>	</a:t>
-            </a:r>
-            <a:r>
-              <a:rPr lang="en-US" sz="1200" dirty="0"/>
-              <a:t>Jason </a:t>
-            </a:r>
-            <a:r>
-              <a:rPr lang="en-US" sz="1200" dirty="0" err="1" smtClean="0"/>
-              <a:t>Yosinski</a:t>
-            </a:r>
-            <a:r>
-              <a:rPr lang="en-US" sz="1200" dirty="0" smtClean="0"/>
-              <a:t>, </a:t>
-            </a:r>
-            <a:r>
-              <a:rPr lang="en-US" sz="1200" dirty="0"/>
-              <a:t>Jeff </a:t>
-            </a:r>
-            <a:r>
-              <a:rPr lang="en-US" sz="1200" dirty="0" err="1" smtClean="0"/>
-              <a:t>Clune</a:t>
-            </a:r>
-            <a:r>
-              <a:rPr lang="en-US" sz="1200" dirty="0" smtClean="0"/>
-              <a:t>, </a:t>
-            </a:r>
-            <a:r>
-              <a:rPr lang="en-US" sz="1200" dirty="0"/>
-              <a:t>Diana </a:t>
-            </a:r>
-            <a:r>
-              <a:rPr lang="en-US" sz="1200" dirty="0" smtClean="0"/>
-              <a:t>Hidalgo, </a:t>
-            </a:r>
-            <a:r>
-              <a:rPr lang="en-US" sz="1200" dirty="0"/>
-              <a:t>Sarah </a:t>
-            </a:r>
-            <a:r>
-              <a:rPr lang="en-US" sz="1200" dirty="0" smtClean="0"/>
-              <a:t>Nguyen, </a:t>
-            </a:r>
-            <a:r>
-              <a:rPr lang="en-US" sz="1200" dirty="0"/>
-              <a:t>Juan Cristobal </a:t>
-            </a:r>
-            <a:r>
-              <a:rPr lang="en-US" sz="1200" dirty="0" err="1" smtClean="0"/>
-              <a:t>Zagal</a:t>
-            </a:r>
-            <a:r>
-              <a:rPr lang="en-US" sz="1200" dirty="0" smtClean="0"/>
-              <a:t>, </a:t>
-            </a:r>
-            <a:r>
-              <a:rPr lang="en-US" sz="1200" dirty="0"/>
-              <a:t>and </a:t>
-            </a:r>
-            <a:r>
-              <a:rPr lang="en-US" sz="1200" dirty="0" err="1"/>
-              <a:t>Hod</a:t>
-            </a:r>
-            <a:r>
-              <a:rPr lang="en-US" sz="1200" dirty="0"/>
-              <a:t> </a:t>
-            </a:r>
-            <a:r>
-              <a:rPr lang="en-US" sz="1200" dirty="0" smtClean="0"/>
-              <a:t>Lipson (2011)</a:t>
-            </a:r>
-            <a:endParaRPr lang="en-US" sz="1200" dirty="0"/>
-          </a:p>
-          <a:p>
-            <a:pPr eaLnBrk="1" hangingPunct="1">
+              <a:rPr lang="en-GB" dirty="0" smtClean="0"/>
+              <a:t>Fitness</a:t>
+            </a:r>
+            <a:r>
+              <a:rPr lang="en-GB" dirty="0" smtClean="0"/>
+              <a:t>:</a:t>
+            </a:r>
+          </a:p>
+          <a:p>
+            <a:pPr lvl="1" eaLnBrk="1" hangingPunct="1">
               <a:lnSpc>
                 <a:spcPct val="100000"/>
               </a:lnSpc>
@@ -7950,31 +8392,16 @@
               </a:spcAft>
             </a:pPr>
             <a:r>
-              <a:rPr lang="en-US" dirty="0" smtClean="0"/>
-              <a:t>A Step Toward Evolving Biped Walking Behavior Through Indirect Encoding</a:t>
-            </a:r>
-          </a:p>
-          <a:p>
-            <a:pPr marL="0" indent="0" eaLnBrk="1" hangingPunct="1">
-              <a:lnSpc>
-                <a:spcPct val="100000"/>
-              </a:lnSpc>
-              <a:spcAft>
-                <a:spcPts val="1042"/>
-              </a:spcAft>
-              <a:buNone/>
-            </a:pPr>
-            <a:r>
-              <a:rPr lang="en-US" dirty="0"/>
-              <a:t>	</a:t>
-            </a:r>
-            <a:r>
-              <a:rPr lang="en-US" sz="1200" dirty="0" smtClean="0"/>
-              <a:t>Randal Olsen (2010)</a:t>
-            </a:r>
-          </a:p>
-          <a:p>
-            <a:pPr eaLnBrk="1" hangingPunct="1">
+              <a:rPr lang="en-GB" dirty="0" err="1" smtClean="0"/>
+              <a:t>Maximalization</a:t>
+            </a:r>
+            <a:r>
+              <a:rPr lang="en-GB" dirty="0" smtClean="0"/>
+              <a:t> within N seconds;</a:t>
+            </a:r>
+          </a:p>
+          <a:p>
+            <a:pPr lvl="1" eaLnBrk="1" hangingPunct="1">
               <a:lnSpc>
                 <a:spcPct val="100000"/>
               </a:lnSpc>
@@ -7983,80 +8410,74 @@
               </a:spcAft>
             </a:pPr>
             <a:r>
-              <a:rPr lang="en-US" dirty="0" smtClean="0"/>
-              <a:t>Gait Evolution for Humanoid Robot in a Physically Simulated Environment </a:t>
-            </a:r>
-          </a:p>
-          <a:p>
-            <a:pPr marL="0" indent="0" eaLnBrk="1" hangingPunct="1">
+              <a:rPr lang="en-GB" dirty="0" smtClean="0"/>
+              <a:t>Falling over means minimal fitness;</a:t>
+            </a:r>
+          </a:p>
+          <a:p>
+            <a:pPr lvl="1" eaLnBrk="1" hangingPunct="1">
               <a:lnSpc>
                 <a:spcPct val="100000"/>
               </a:lnSpc>
               <a:spcAft>
                 <a:spcPts val="1042"/>
               </a:spcAft>
-              <a:buNone/>
             </a:pPr>
             <a:r>
-              <a:rPr lang="en-US" dirty="0" smtClean="0"/>
-              <a:t>	</a:t>
-            </a:r>
-            <a:r>
-              <a:rPr lang="en-US" sz="1200" dirty="0" err="1" smtClean="0"/>
-              <a:t>Nesrine</a:t>
-            </a:r>
-            <a:r>
-              <a:rPr lang="en-US" sz="1200" dirty="0" smtClean="0"/>
-              <a:t> </a:t>
-            </a:r>
-            <a:r>
-              <a:rPr lang="en-US" sz="1200" dirty="0" err="1" smtClean="0"/>
-              <a:t>Ouannes</a:t>
-            </a:r>
-            <a:r>
-              <a:rPr lang="en-US" sz="1200" dirty="0" smtClean="0"/>
-              <a:t>, </a:t>
-            </a:r>
-            <a:r>
-              <a:rPr lang="en-US" sz="1200" dirty="0" err="1" smtClean="0"/>
-              <a:t>NourEddine</a:t>
-            </a:r>
-            <a:r>
-              <a:rPr lang="en-US" sz="1200" dirty="0" smtClean="0"/>
-              <a:t> </a:t>
-            </a:r>
-            <a:r>
-              <a:rPr lang="en-US" sz="1200" dirty="0" err="1" smtClean="0"/>
-              <a:t>Djedi</a:t>
-            </a:r>
-            <a:r>
-              <a:rPr lang="en-US" sz="1200" dirty="0" smtClean="0"/>
-              <a:t>, Yves </a:t>
-            </a:r>
-            <a:r>
-              <a:rPr lang="en-US" sz="1200" dirty="0" err="1" smtClean="0"/>
-              <a:t>Duthen</a:t>
-            </a:r>
-            <a:r>
-              <a:rPr lang="en-US" sz="1200" dirty="0" smtClean="0"/>
-              <a:t> and </a:t>
-            </a:r>
-            <a:r>
-              <a:rPr lang="en-US" sz="1200" dirty="0" err="1" smtClean="0"/>
-              <a:t>Hervé</a:t>
-            </a:r>
-            <a:r>
-              <a:rPr lang="en-US" sz="1200" dirty="0" smtClean="0"/>
-              <a:t> </a:t>
-            </a:r>
-            <a:r>
-              <a:rPr lang="en-US" sz="1200" dirty="0" err="1" smtClean="0"/>
-              <a:t>Luga</a:t>
-            </a:r>
-            <a:r>
-              <a:rPr lang="en-US" sz="1200" dirty="0" smtClean="0"/>
-              <a:t> (2011)</a:t>
-            </a:r>
+              <a:rPr lang="en-GB" dirty="0" smtClean="0"/>
+              <a:t>Properties:</a:t>
+            </a:r>
+          </a:p>
+          <a:p>
+            <a:pPr lvl="3" eaLnBrk="1" hangingPunct="1">
+              <a:lnSpc>
+                <a:spcPct val="100000"/>
+              </a:lnSpc>
+              <a:spcAft>
+                <a:spcPts val="1042"/>
+              </a:spcAft>
+            </a:pPr>
+            <a:r>
+              <a:rPr lang="en-GB" dirty="0" smtClean="0"/>
+              <a:t>Distance;</a:t>
+            </a:r>
+          </a:p>
+          <a:p>
+            <a:pPr lvl="3" eaLnBrk="1" hangingPunct="1">
+              <a:lnSpc>
+                <a:spcPct val="100000"/>
+              </a:lnSpc>
+              <a:spcAft>
+                <a:spcPts val="1042"/>
+              </a:spcAft>
+            </a:pPr>
+            <a:r>
+              <a:rPr lang="en-GB" dirty="0" smtClean="0"/>
+              <a:t>Speed.</a:t>
+            </a:r>
+          </a:p>
+          <a:p>
+            <a:pPr lvl="3" eaLnBrk="1" hangingPunct="1">
+              <a:lnSpc>
+                <a:spcPct val="100000"/>
+              </a:lnSpc>
+              <a:spcAft>
+                <a:spcPts val="1042"/>
+              </a:spcAft>
+            </a:pPr>
+            <a:endParaRPr lang="en-GB" dirty="0" smtClean="0"/>
+          </a:p>
+          <a:p>
+            <a:pPr lvl="3" eaLnBrk="1" hangingPunct="1">
+              <a:lnSpc>
+                <a:spcPct val="100000"/>
+              </a:lnSpc>
+              <a:spcAft>
+                <a:spcPts val="1042"/>
+              </a:spcAft>
+              <a:buNone/>
+            </a:pPr>
+            <a:endParaRPr lang="en-GB" dirty="0" smtClean="0"/>
           </a:p>
         </p:txBody>
       </p:sp>
@@ -8087,7 +8508,7 @@
     </p:spTree>
     <p:extLst>
       <p:ext uri="{BB962C8B-B14F-4D97-AF65-F5344CB8AC3E}">
-        <p14:creationId xmlns:mc="http://schemas.openxmlformats.org/markup-compatibility/2006" xmlns:mv="urn:schemas-microsoft-com:mac:vml" xmlns:p14="http://schemas.microsoft.com/office/powerpoint/2010/main" xmlns:p="http://schemas.openxmlformats.org/presentationml/2006/main" xmlns:r="http://schemas.openxmlformats.org/officeDocument/2006/relationships" xmlns:a="http://schemas.openxmlformats.org/drawingml/2006/main" xmlns="" val="3886637528"/>
+        <p14:creationId xmlns="" xmlns:a="http://schemas.openxmlformats.org/drawingml/2006/main" xmlns:r="http://schemas.openxmlformats.org/officeDocument/2006/relationships" xmlns:p="http://schemas.openxmlformats.org/presentationml/2006/main" xmlns:p14="http://schemas.microsoft.com/office/powerpoint/2010/main" xmlns:mv="urn:schemas-microsoft-com:mac:vml" xmlns:mc="http://schemas.openxmlformats.org/markup-compatibility/2006" val="75972892"/>
       </p:ext>
     </p:extLst>
   </p:cSld>
@@ -8150,7 +8571,27 @@
                 <a:latin typeface="Arial" pitchFamily="-108" charset="0"/>
                 <a:ea typeface="ＭＳ Ｐゴシック" pitchFamily="-108" charset="-128"/>
               </a:rPr>
-              <a:t>Discussion</a:t>
+              <a:t>Previous</a:t>
+            </a:r>
+            <a:r>
+              <a:rPr lang="nl-NL" sz="2800" dirty="0" smtClean="0">
+                <a:solidFill>
+                  <a:srgbClr val="BE301A"/>
+                </a:solidFill>
+                <a:latin typeface="Arial" pitchFamily="-108" charset="0"/>
+                <a:ea typeface="ＭＳ Ｐゴシック" pitchFamily="-108" charset="-128"/>
+              </a:rPr>
+              <a:t> </a:t>
+            </a:r>
+            <a:r>
+              <a:rPr lang="nl-NL" sz="2800" dirty="0" err="1" smtClean="0">
+                <a:solidFill>
+                  <a:srgbClr val="BE301A"/>
+                </a:solidFill>
+                <a:latin typeface="Arial" pitchFamily="-108" charset="0"/>
+                <a:ea typeface="ＭＳ Ｐゴシック" pitchFamily="-108" charset="-128"/>
+              </a:rPr>
+              <a:t>work</a:t>
             </a:r>
             <a:endParaRPr lang="nl-NL" sz="2800" dirty="0">
               <a:solidFill>
@@ -8190,7 +8631,274 @@
                 <a:spcPts val="1042"/>
               </a:spcAft>
             </a:pPr>
-            <a:endParaRPr lang="en-GB" dirty="0" smtClean="0"/>
+            <a:r>
+              <a:rPr lang="en-GB" dirty="0"/>
+              <a:t>Ice Skating Humanoid </a:t>
+            </a:r>
+            <a:r>
+              <a:rPr lang="en-GB" dirty="0" smtClean="0"/>
+              <a:t>Robot </a:t>
+            </a:r>
+          </a:p>
+          <a:p>
+            <a:pPr marL="0" indent="0" eaLnBrk="1" hangingPunct="1">
+              <a:lnSpc>
+                <a:spcPct val="100000"/>
+              </a:lnSpc>
+              <a:spcAft>
+                <a:spcPts val="1042"/>
+              </a:spcAft>
+              <a:buNone/>
+            </a:pPr>
+            <a:r>
+              <a:rPr lang="en-GB" sz="1200" dirty="0"/>
+              <a:t>	</a:t>
+            </a:r>
+            <a:r>
+              <a:rPr lang="en-US" sz="1200" dirty="0" smtClean="0"/>
+              <a:t>Chris </a:t>
+            </a:r>
+            <a:r>
+              <a:rPr lang="en-US" sz="1200" dirty="0" err="1"/>
+              <a:t>Iverach</a:t>
+            </a:r>
+            <a:r>
+              <a:rPr lang="en-US" sz="1200" dirty="0"/>
+              <a:t>-Brereton, Andrew Winton and Jacky </a:t>
+            </a:r>
+            <a:r>
+              <a:rPr lang="en-US" sz="1200" dirty="0" err="1" smtClean="0"/>
+              <a:t>Baltes</a:t>
+            </a:r>
+            <a:r>
+              <a:rPr lang="en-US" sz="1200" dirty="0" smtClean="0"/>
+              <a:t> (2012)</a:t>
+            </a:r>
+            <a:endParaRPr lang="en-GB" sz="1200" dirty="0" smtClean="0"/>
+          </a:p>
+          <a:p>
+            <a:pPr eaLnBrk="1" hangingPunct="1">
+              <a:lnSpc>
+                <a:spcPct val="100000"/>
+              </a:lnSpc>
+              <a:spcAft>
+                <a:spcPts val="1042"/>
+              </a:spcAft>
+            </a:pPr>
+            <a:r>
+              <a:rPr lang="en-US" dirty="0" smtClean="0"/>
+              <a:t>Evolving Robot Gaits in Hardware: the </a:t>
+            </a:r>
+            <a:r>
+              <a:rPr lang="en-US" dirty="0" err="1" smtClean="0"/>
+              <a:t>HyperNEAT</a:t>
+            </a:r>
+            <a:r>
+              <a:rPr lang="en-US" dirty="0" smtClean="0"/>
+              <a:t> Generative Encoding Vs. Parameter Optimization</a:t>
+            </a:r>
+          </a:p>
+          <a:p>
+            <a:pPr marL="0" indent="0" eaLnBrk="1" hangingPunct="1">
+              <a:lnSpc>
+                <a:spcPct val="100000"/>
+              </a:lnSpc>
+              <a:spcAft>
+                <a:spcPts val="1042"/>
+              </a:spcAft>
+              <a:buNone/>
+            </a:pPr>
+            <a:r>
+              <a:rPr lang="en-US" dirty="0" smtClean="0"/>
+              <a:t>	</a:t>
+            </a:r>
+            <a:r>
+              <a:rPr lang="en-US" sz="1200" dirty="0"/>
+              <a:t>Jason </a:t>
+            </a:r>
+            <a:r>
+              <a:rPr lang="en-US" sz="1200" dirty="0" err="1" smtClean="0"/>
+              <a:t>Yosinski</a:t>
+            </a:r>
+            <a:r>
+              <a:rPr lang="en-US" sz="1200" dirty="0" smtClean="0"/>
+              <a:t>, </a:t>
+            </a:r>
+            <a:r>
+              <a:rPr lang="en-US" sz="1200" dirty="0"/>
+              <a:t>Jeff </a:t>
+            </a:r>
+            <a:r>
+              <a:rPr lang="en-US" sz="1200" dirty="0" err="1" smtClean="0"/>
+              <a:t>Clune</a:t>
+            </a:r>
+            <a:r>
+              <a:rPr lang="en-US" sz="1200" dirty="0" smtClean="0"/>
+              <a:t>, </a:t>
+            </a:r>
+            <a:r>
+              <a:rPr lang="en-US" sz="1200" dirty="0"/>
+              <a:t>Diana </a:t>
+            </a:r>
+            <a:r>
+              <a:rPr lang="en-US" sz="1200" dirty="0" smtClean="0"/>
+              <a:t>Hidalgo, </a:t>
+            </a:r>
+            <a:r>
+              <a:rPr lang="en-US" sz="1200" dirty="0"/>
+              <a:t>Sarah </a:t>
+            </a:r>
+            <a:r>
+              <a:rPr lang="en-US" sz="1200" dirty="0" smtClean="0"/>
+              <a:t>Nguyen, </a:t>
+            </a:r>
+            <a:r>
+              <a:rPr lang="en-US" sz="1200" dirty="0"/>
+              <a:t>Juan Cristobal </a:t>
+            </a:r>
+            <a:r>
+              <a:rPr lang="en-US" sz="1200" dirty="0" err="1" smtClean="0"/>
+              <a:t>Zagal</a:t>
+            </a:r>
+            <a:r>
+              <a:rPr lang="en-US" sz="1200" dirty="0" smtClean="0"/>
+              <a:t>, </a:t>
+            </a:r>
+            <a:r>
+              <a:rPr lang="en-US" sz="1200" dirty="0"/>
+              <a:t>and </a:t>
+            </a:r>
+            <a:r>
+              <a:rPr lang="en-US" sz="1200" dirty="0" err="1"/>
+              <a:t>Hod</a:t>
+            </a:r>
+            <a:r>
+              <a:rPr lang="en-US" sz="1200" dirty="0"/>
+              <a:t> </a:t>
+            </a:r>
+            <a:r>
+              <a:rPr lang="en-US" sz="1200" dirty="0" smtClean="0"/>
+              <a:t>Lipson (2011)</a:t>
+            </a:r>
+            <a:endParaRPr lang="en-US" sz="1200" dirty="0"/>
+          </a:p>
+          <a:p>
+            <a:pPr eaLnBrk="1" hangingPunct="1">
+              <a:lnSpc>
+                <a:spcPct val="100000"/>
+              </a:lnSpc>
+              <a:spcAft>
+                <a:spcPts val="1042"/>
+              </a:spcAft>
+            </a:pPr>
+            <a:r>
+              <a:rPr lang="en-US" dirty="0" smtClean="0"/>
+              <a:t>A Step Toward Evolving Biped Walking Behavior Through Indirect Encoding</a:t>
+            </a:r>
+          </a:p>
+          <a:p>
+            <a:pPr marL="0" indent="0" eaLnBrk="1" hangingPunct="1">
+              <a:lnSpc>
+                <a:spcPct val="100000"/>
+              </a:lnSpc>
+              <a:spcAft>
+                <a:spcPts val="1042"/>
+              </a:spcAft>
+              <a:buNone/>
+            </a:pPr>
+            <a:r>
+              <a:rPr lang="en-US" dirty="0"/>
+              <a:t>	</a:t>
+            </a:r>
+            <a:r>
+              <a:rPr lang="en-US" sz="1200" dirty="0" smtClean="0"/>
+              <a:t>Randal Olsen (2010)</a:t>
+            </a:r>
+          </a:p>
+          <a:p>
+            <a:pPr eaLnBrk="1" hangingPunct="1">
+              <a:lnSpc>
+                <a:spcPct val="100000"/>
+              </a:lnSpc>
+              <a:spcAft>
+                <a:spcPts val="1042"/>
+              </a:spcAft>
+            </a:pPr>
+            <a:r>
+              <a:rPr lang="en-US" dirty="0" smtClean="0"/>
+              <a:t>Gait Evolution for Humanoid Robot in a Physically Simulated Environment </a:t>
+            </a:r>
+          </a:p>
+          <a:p>
+            <a:pPr marL="0" indent="0" eaLnBrk="1" hangingPunct="1">
+              <a:lnSpc>
+                <a:spcPct val="100000"/>
+              </a:lnSpc>
+              <a:spcAft>
+                <a:spcPts val="1042"/>
+              </a:spcAft>
+              <a:buNone/>
+            </a:pPr>
+            <a:r>
+              <a:rPr lang="en-US" dirty="0" smtClean="0"/>
+              <a:t>	</a:t>
+            </a:r>
+            <a:r>
+              <a:rPr lang="en-US" sz="1200" dirty="0" err="1" smtClean="0"/>
+              <a:t>Nesrine</a:t>
+            </a:r>
+            <a:r>
+              <a:rPr lang="en-US" sz="1200" dirty="0" smtClean="0"/>
+              <a:t> </a:t>
+            </a:r>
+            <a:r>
+              <a:rPr lang="en-US" sz="1200" dirty="0" err="1" smtClean="0"/>
+              <a:t>Ouannes</a:t>
+            </a:r>
+            <a:r>
+              <a:rPr lang="en-US" sz="1200" dirty="0" smtClean="0"/>
+              <a:t>, </a:t>
+            </a:r>
+            <a:r>
+              <a:rPr lang="en-US" sz="1200" dirty="0" err="1" smtClean="0"/>
+              <a:t>NourEddine</a:t>
+            </a:r>
+            <a:r>
+              <a:rPr lang="en-US" sz="1200" dirty="0" smtClean="0"/>
+              <a:t> </a:t>
+            </a:r>
+            <a:r>
+              <a:rPr lang="en-US" sz="1200" dirty="0" err="1" smtClean="0"/>
+              <a:t>Djedi</a:t>
+            </a:r>
+            <a:r>
+              <a:rPr lang="en-US" sz="1200" dirty="0" smtClean="0"/>
+              <a:t>, Yves </a:t>
+            </a:r>
+            <a:r>
+              <a:rPr lang="en-US" sz="1200" dirty="0" err="1" smtClean="0"/>
+              <a:t>Duthen</a:t>
+            </a:r>
+            <a:r>
+              <a:rPr lang="en-US" sz="1200" dirty="0" smtClean="0"/>
+              <a:t> and </a:t>
+            </a:r>
+            <a:r>
+              <a:rPr lang="en-US" sz="1200" dirty="0" err="1" smtClean="0"/>
+              <a:t>Hervé</a:t>
+            </a:r>
+            <a:r>
+              <a:rPr lang="en-US" sz="1200" dirty="0" smtClean="0"/>
+              <a:t> </a:t>
+            </a:r>
+            <a:r>
+              <a:rPr lang="en-US" sz="1200" dirty="0" err="1" smtClean="0"/>
+              <a:t>Luga</a:t>
+            </a:r>
+            <a:r>
+              <a:rPr lang="en-US" sz="1200" dirty="0" smtClean="0"/>
+              <a:t> (2011)</a:t>
+            </a:r>
           </a:p>
         </p:txBody>
       </p:sp>
@@ -8221,7 +8929,249 @@
     </p:spTree>
     <p:extLst>
       <p:ext uri="{BB962C8B-B14F-4D97-AF65-F5344CB8AC3E}">
-        <p14:creationId xmlns:mc="http://schemas.openxmlformats.org/markup-compatibility/2006" xmlns:mv="urn:schemas-microsoft-com:mac:vml" xmlns:p14="http://schemas.microsoft.com/office/powerpoint/2010/main" xmlns:p="http://schemas.openxmlformats.org/presentationml/2006/main" xmlns:r="http://schemas.openxmlformats.org/officeDocument/2006/relationships" xmlns:a="http://schemas.openxmlformats.org/drawingml/2006/main" xmlns="" val="201712783"/>
+        <p14:creationId xmlns="" xmlns:a="http://schemas.openxmlformats.org/drawingml/2006/main" xmlns:r="http://schemas.openxmlformats.org/officeDocument/2006/relationships" xmlns:p="http://schemas.openxmlformats.org/presentationml/2006/main" xmlns:p14="http://schemas.microsoft.com/office/powerpoint/2010/main" xmlns:mv="urn:schemas-microsoft-com:mac:vml" xmlns:mc="http://schemas.openxmlformats.org/markup-compatibility/2006" val="3886637528"/>
+      </p:ext>
+    </p:extLst>
+  </p:cSld>
+  <p:clrMapOvr>
+    <a:masterClrMapping/>
+  </p:clrMapOvr>
+  <p:transition/>
+  <p:timing>
+    <p:tnLst>
+      <p:par>
+        <p:cTn id="1" dur="indefinite" restart="never" nodeType="tmRoot"/>
+      </p:par>
+    </p:tnLst>
+  </p:timing>
+</p:sld>
+</file>
+
+<file path=ppt/slides/slide9.xml><?xml version="1.0" encoding="utf-8"?>
+<p:sld xmlns:a="http://schemas.openxmlformats.org/drawingml/2006/main" xmlns:r="http://schemas.openxmlformats.org/officeDocument/2006/relationships" xmlns:mc="http://schemas.openxmlformats.org/markup-compatibility/2006" xmlns:mv="urn:schemas-microsoft-com:mac:vml" xmlns:p="http://schemas.openxmlformats.org/presentationml/2006/main" mc:Ignorable="mv" mc:PreserveAttributes="mv:*">
+  <p:cSld>
+    <p:spTree>
+      <p:nvGrpSpPr>
+        <p:cNvPr id="1" name=""/>
+        <p:cNvGrpSpPr/>
+        <p:nvPr/>
+      </p:nvGrpSpPr>
+      <p:grpSpPr>
+        <a:xfrm>
+          <a:off x="0" y="0"/>
+          <a:ext cx="0" cy="0"/>
+          <a:chOff x="0" y="0"/>
+          <a:chExt cx="0" cy="0"/>
+        </a:xfrm>
+      </p:grpSpPr>
+      <p:sp>
+        <p:nvSpPr>
+          <p:cNvPr id="20482" name="Titel 3"/>
+          <p:cNvSpPr>
+            <a:spLocks noGrp="1"/>
+          </p:cNvSpPr>
+          <p:nvPr>
+            <p:ph type="title"/>
+          </p:nvPr>
+        </p:nvSpPr>
+        <p:spPr>
+          <a:xfrm>
+            <a:off x="685633" y="930573"/>
+            <a:ext cx="8794719" cy="482203"/>
+          </a:xfrm>
+        </p:spPr>
+        <p:txBody>
+          <a:bodyPr/>
+          <a:lstStyle/>
+          <a:p>
+            <a:r>
+              <a:rPr lang="nl-NL" sz="2800" dirty="0" err="1" smtClean="0">
+                <a:solidFill>
+                  <a:srgbClr val="BE301A"/>
+                </a:solidFill>
+                <a:latin typeface="Arial" pitchFamily="-108" charset="0"/>
+                <a:ea typeface="ＭＳ Ｐゴシック" pitchFamily="-108" charset="-128"/>
+              </a:rPr>
+              <a:t>Discussion</a:t>
+            </a:r>
+            <a:endParaRPr lang="nl-NL" sz="2800" dirty="0">
+              <a:solidFill>
+                <a:srgbClr val="BE301A"/>
+              </a:solidFill>
+              <a:latin typeface="Arial" pitchFamily="-108" charset="0"/>
+              <a:ea typeface="ＭＳ Ｐゴシック" pitchFamily="-108" charset="-128"/>
+            </a:endParaRPr>
+          </a:p>
+        </p:txBody>
+      </p:sp>
+      <p:sp>
+        <p:nvSpPr>
+          <p:cNvPr id="5" name="Tijdelijke aanduiding voor inhoud 4"/>
+          <p:cNvSpPr>
+            <a:spLocks noGrp="1"/>
+          </p:cNvSpPr>
+          <p:nvPr>
+            <p:ph idx="1"/>
+          </p:nvPr>
+        </p:nvSpPr>
+        <p:spPr>
+          <a:xfrm>
+            <a:off x="685633" y="1723454"/>
+            <a:ext cx="8794719" cy="3937794"/>
+          </a:xfrm>
+        </p:spPr>
+        <p:txBody>
+          <a:bodyPr/>
+          <a:lstStyle/>
+          <a:p>
+            <a:pPr eaLnBrk="1" hangingPunct="1">
+              <a:lnSpc>
+                <a:spcPct val="100000"/>
+              </a:lnSpc>
+              <a:spcAft>
+                <a:spcPts val="1042"/>
+              </a:spcAft>
+            </a:pPr>
+            <a:r>
+              <a:rPr lang="en-GB" dirty="0" smtClean="0"/>
+              <a:t>What types of input could we use to initialize the algorithm?</a:t>
+            </a:r>
+          </a:p>
+          <a:p>
+            <a:pPr eaLnBrk="1" hangingPunct="1">
+              <a:lnSpc>
+                <a:spcPct val="100000"/>
+              </a:lnSpc>
+              <a:spcAft>
+                <a:spcPts val="1042"/>
+              </a:spcAft>
+            </a:pPr>
+            <a:endParaRPr lang="en-GB" dirty="0" smtClean="0"/>
+          </a:p>
+          <a:p>
+            <a:pPr eaLnBrk="1" hangingPunct="1">
+              <a:lnSpc>
+                <a:spcPct val="100000"/>
+              </a:lnSpc>
+              <a:spcAft>
+                <a:spcPts val="1042"/>
+              </a:spcAft>
+            </a:pPr>
+            <a:r>
+              <a:rPr lang="en-GB" dirty="0" smtClean="0"/>
+              <a:t>Usage of </a:t>
+            </a:r>
+            <a:r>
+              <a:rPr lang="en-GB" dirty="0" err="1" smtClean="0"/>
+              <a:t>Kinect</a:t>
+            </a:r>
+            <a:r>
+              <a:rPr lang="en-GB" dirty="0" smtClean="0"/>
+              <a:t> to capture stick models</a:t>
+            </a:r>
+          </a:p>
+          <a:p>
+            <a:pPr eaLnBrk="1" hangingPunct="1">
+              <a:lnSpc>
+                <a:spcPct val="100000"/>
+              </a:lnSpc>
+              <a:spcAft>
+                <a:spcPts val="1042"/>
+              </a:spcAft>
+            </a:pPr>
+            <a:endParaRPr lang="en-GB" dirty="0" smtClean="0"/>
+          </a:p>
+          <a:p>
+            <a:pPr eaLnBrk="1" hangingPunct="1">
+              <a:lnSpc>
+                <a:spcPct val="100000"/>
+              </a:lnSpc>
+              <a:spcAft>
+                <a:spcPts val="1042"/>
+              </a:spcAft>
+            </a:pPr>
+            <a:r>
+              <a:rPr lang="en-GB" dirty="0" smtClean="0"/>
+              <a:t>Ideas on fitness</a:t>
+            </a:r>
+          </a:p>
+          <a:p>
+            <a:pPr eaLnBrk="1" hangingPunct="1">
+              <a:lnSpc>
+                <a:spcPct val="100000"/>
+              </a:lnSpc>
+              <a:spcAft>
+                <a:spcPts val="1042"/>
+              </a:spcAft>
+            </a:pPr>
+            <a:endParaRPr lang="en-GB" dirty="0" smtClean="0"/>
+          </a:p>
+          <a:p>
+            <a:pPr eaLnBrk="1" hangingPunct="1">
+              <a:lnSpc>
+                <a:spcPct val="100000"/>
+              </a:lnSpc>
+              <a:spcAft>
+                <a:spcPts val="1042"/>
+              </a:spcAft>
+            </a:pPr>
+            <a:r>
+              <a:rPr lang="en-GB" dirty="0" smtClean="0"/>
+              <a:t>Other simulators / algorithms</a:t>
+            </a:r>
+          </a:p>
+          <a:p>
+            <a:pPr eaLnBrk="1" hangingPunct="1">
+              <a:lnSpc>
+                <a:spcPct val="100000"/>
+              </a:lnSpc>
+              <a:spcAft>
+                <a:spcPts val="1042"/>
+              </a:spcAft>
+            </a:pPr>
+            <a:endParaRPr lang="en-GB" dirty="0" smtClean="0"/>
+          </a:p>
+          <a:p>
+            <a:pPr eaLnBrk="1" hangingPunct="1">
+              <a:lnSpc>
+                <a:spcPct val="100000"/>
+              </a:lnSpc>
+              <a:spcAft>
+                <a:spcPts val="1042"/>
+              </a:spcAft>
+            </a:pPr>
+            <a:endParaRPr lang="en-GB" dirty="0" smtClean="0"/>
+          </a:p>
+        </p:txBody>
+      </p:sp>
+      <p:sp>
+        <p:nvSpPr>
+          <p:cNvPr id="6" name="Slide Number Placeholder 5"/>
+          <p:cNvSpPr>
+            <a:spLocks noGrp="1"/>
+          </p:cNvSpPr>
+          <p:nvPr>
+            <p:ph type="sldNum" sz="quarter" idx="4"/>
+          </p:nvPr>
+        </p:nvSpPr>
+        <p:spPr/>
+        <p:txBody>
+          <a:bodyPr/>
+          <a:lstStyle/>
+          <a:p>
+            <a:fld id="{314170C9-A4E0-3344-A34B-6B914C1DB9BD}" type="slidenum">
+              <a:rPr lang="en-GB" smtClean="0"/>
+              <a:pPr/>
+              <a:t>8</a:t>
+            </a:fld>
+            <a:endParaRPr lang="en-GB" dirty="0"/>
+          </a:p>
+        </p:txBody>
+      </p:sp>
+    </p:spTree>
+    <p:extLst>
+      <p:ext uri="{BB962C8B-B14F-4D97-AF65-F5344CB8AC3E}">
+        <p14:creationId xmlns="" xmlns:a="http://schemas.openxmlformats.org/drawingml/2006/main" xmlns:r="http://schemas.openxmlformats.org/officeDocument/2006/relationships" xmlns:p="http://schemas.openxmlformats.org/presentationml/2006/main" xmlns:p14="http://schemas.microsoft.com/office/powerpoint/2010/main" xmlns:mv="urn:schemas-microsoft-com:mac:vml" xmlns:mc="http://schemas.openxmlformats.org/markup-compatibility/2006" val="201712783"/>
       </p:ext>
     </p:extLst>
   </p:cSld>

</xml_diff>

<commit_message>
Small changes before presentation;
</commit_message>
<xml_diff>
--- a/Documents/Presentations/Presentation Evolutionary Algorithms.pptx
+++ b/Documents/Presentations/Presentation Evolutionary Algorithms.pptx
@@ -1234,13 +1234,9 @@
             </a:r>
             <a:r>
               <a:rPr lang="en-GB" b="0" baseline="0" dirty="0" smtClean="0"/>
-              <a:t>-evolution </a:t>
-            </a:r>
-            <a:r>
-              <a:rPr lang="en-GB" b="0" baseline="0" smtClean="0"/>
-              <a:t>work?</a:t>
-            </a:r>
-            <a:endParaRPr lang="en-GB" smtClean="0"/>
+              <a:t>-evolution work?</a:t>
+            </a:r>
+            <a:endParaRPr lang="en-GB" dirty="0" smtClean="0"/>
           </a:p>
           <a:p>
             <a:endParaRPr lang="en-GB" dirty="0" smtClean="0"/>
@@ -7022,7 +7018,14 @@
             </a:r>
             <a:r>
               <a:rPr lang="nl-NL" b="1" dirty="0" smtClean="0"/>
-              <a:t>, Roland </a:t>
+              <a:t> </a:t>
+            </a:r>
+          </a:p>
+          <a:p>
+            <a:pPr algn="r" eaLnBrk="1" hangingPunct="1"/>
+            <a:r>
+              <a:rPr lang="nl-NL" b="1" dirty="0" smtClean="0"/>
+              <a:t>Roland </a:t>
             </a:r>
             <a:r>
               <a:rPr lang="nl-NL" b="1" dirty="0" err="1" smtClean="0"/>
@@ -7034,21 +7037,30 @@
             <a:pPr algn="r" eaLnBrk="1" hangingPunct="1"/>
             <a:r>
               <a:rPr lang="nl-NL" b="1" dirty="0" smtClean="0"/>
-              <a:t> &amp; Tom de Ruijter</a:t>
-            </a:r>
+              <a:t>Tom </a:t>
+            </a:r>
+            <a:r>
+              <a:rPr lang="nl-NL" b="1" dirty="0" smtClean="0"/>
+              <a:t>de Ruijter</a:t>
+            </a:r>
+            <a:endParaRPr lang="nl-NL" b="1" dirty="0" smtClean="0"/>
           </a:p>
           <a:p>
             <a:pPr algn="r" eaLnBrk="1" hangingPunct="1"/>
-            <a:r>
-              <a:rPr lang="nl-NL" b="1" dirty="0" smtClean="0"/>
+            <a:endParaRPr lang="nl-NL" dirty="0" smtClean="0"/>
+          </a:p>
+          <a:p>
+            <a:pPr algn="r" eaLnBrk="1" hangingPunct="1"/>
+            <a:r>
+              <a:rPr lang="nl-NL" dirty="0" smtClean="0"/>
               <a:t>2 </a:t>
             </a:r>
             <a:r>
-              <a:rPr lang="nl-NL" b="1" dirty="0" err="1" smtClean="0"/>
+              <a:rPr lang="nl-NL" dirty="0" err="1" smtClean="0"/>
               <a:t>October</a:t>
             </a:r>
             <a:r>
-              <a:rPr lang="nl-NL" b="1" dirty="0" smtClean="0"/>
+              <a:rPr lang="nl-NL" dirty="0" smtClean="0"/>
               <a:t> 2012</a:t>
             </a:r>
           </a:p>
@@ -7905,13 +7917,9 @@
             </a:r>
             <a:r>
               <a:rPr lang="en-GB" dirty="0" smtClean="0"/>
-              <a:t>-evolution </a:t>
-            </a:r>
-            <a:r>
-              <a:rPr lang="en-GB" smtClean="0"/>
-              <a:t>algorithm feedback</a:t>
-            </a:r>
-            <a:endParaRPr lang="en-GB" smtClean="0"/>
+              <a:t>-evolution algorithm feedback</a:t>
+            </a:r>
+            <a:endParaRPr lang="en-GB" dirty="0" smtClean="0"/>
           </a:p>
           <a:p>
             <a:pPr eaLnBrk="1" hangingPunct="1">
@@ -8135,8 +8143,23 @@
             </a:pPr>
             <a:r>
               <a:rPr lang="en-GB" dirty="0" smtClean="0"/>
-              <a:t>Initially uniform population.</a:t>
-            </a:r>
+              <a:t>Initially uniform population</a:t>
+            </a:r>
+            <a:r>
+              <a:rPr lang="en-GB" dirty="0" smtClean="0"/>
+              <a:t>.</a:t>
+            </a:r>
+          </a:p>
+          <a:p>
+            <a:pPr lvl="3" eaLnBrk="1" hangingPunct="1">
+              <a:lnSpc>
+                <a:spcPct val="100000"/>
+              </a:lnSpc>
+              <a:spcAft>
+                <a:spcPts val="1042"/>
+              </a:spcAft>
+            </a:pPr>
+            <a:endParaRPr lang="en-GB" dirty="0" smtClean="0"/>
           </a:p>
           <a:p>
             <a:pPr eaLnBrk="1" hangingPunct="1">
@@ -9036,9 +9059,10 @@
               <a:rPr lang="en-GB" dirty="0" smtClean="0"/>
               <a:t>What types of input could we use to initialize the algorithm?</a:t>
             </a:r>
-          </a:p>
-          <a:p>
-            <a:pPr eaLnBrk="1" hangingPunct="1">
+            <a:endParaRPr lang="en-GB" dirty="0" smtClean="0"/>
+          </a:p>
+          <a:p>
+            <a:pPr lvl="3" eaLnBrk="1" hangingPunct="1">
               <a:lnSpc>
                 <a:spcPct val="100000"/>
               </a:lnSpc>
@@ -9046,10 +9070,21 @@
                 <a:spcPts val="1042"/>
               </a:spcAft>
             </a:pPr>
-            <a:endParaRPr lang="en-GB" dirty="0" smtClean="0"/>
-          </a:p>
-          <a:p>
-            <a:pPr eaLnBrk="1" hangingPunct="1">
+            <a:r>
+              <a:rPr lang="en-GB" i="1" dirty="0" smtClean="0"/>
+              <a:t>Usage of </a:t>
+            </a:r>
+            <a:r>
+              <a:rPr lang="en-GB" i="1" dirty="0" err="1" smtClean="0"/>
+              <a:t>Kinect</a:t>
+            </a:r>
+            <a:r>
+              <a:rPr lang="en-GB" i="1" dirty="0" smtClean="0"/>
+              <a:t> to capture stick models</a:t>
+            </a:r>
+          </a:p>
+          <a:p>
+            <a:pPr lvl="3" eaLnBrk="1" hangingPunct="1">
               <a:lnSpc>
                 <a:spcPct val="100000"/>
               </a:lnSpc>
@@ -9058,16 +9093,26 @@
               </a:spcAft>
             </a:pPr>
             <a:r>
-              <a:rPr lang="en-GB" dirty="0" smtClean="0"/>
-              <a:t>Usage of </a:t>
-            </a:r>
-            <a:r>
-              <a:rPr lang="en-GB" dirty="0" err="1" smtClean="0"/>
-              <a:t>Kinect</a:t>
-            </a:r>
-            <a:r>
-              <a:rPr lang="en-GB" dirty="0" smtClean="0"/>
-              <a:t> to capture stick models</a:t>
+              <a:rPr lang="en-GB" i="1" dirty="0" smtClean="0"/>
+              <a:t>Working </a:t>
+            </a:r>
+            <a:r>
+              <a:rPr lang="en-GB" i="1" smtClean="0"/>
+              <a:t>walking gait (on ice)</a:t>
+            </a:r>
+          </a:p>
+          <a:p>
+            <a:pPr lvl="3" eaLnBrk="1" hangingPunct="1">
+              <a:lnSpc>
+                <a:spcPct val="100000"/>
+              </a:lnSpc>
+              <a:spcAft>
+                <a:spcPts val="1042"/>
+              </a:spcAft>
+            </a:pPr>
+            <a:r>
+              <a:rPr lang="en-GB" i="1" dirty="0" smtClean="0"/>
+              <a:t>…</a:t>
             </a:r>
           </a:p>
           <a:p>

</xml_diff>